<commit_message>
Updateds Freebies for newbies workshop 2 ppt
Updated my slides for freebies for newbies ppt workshop 2
</commit_message>
<xml_diff>
--- a/Project_Files/Sprint10/FREEBIES FOR NEWBIES Workshop2 (1).pptx
+++ b/Project_Files/Sprint10/FREEBIES FOR NEWBIES Workshop2 (1).pptx
@@ -5,7 +5,7 @@
     <p:sldMasterId id="2147483660" r:id="rId1"/>
   </p:sldMasterIdLst>
   <p:notesMasterIdLst>
-    <p:notesMasterId r:id="rId8"/>
+    <p:notesMasterId r:id="rId12"/>
   </p:notesMasterIdLst>
   <p:sldIdLst>
     <p:sldId id="256" r:id="rId2"/>
@@ -14,6 +14,10 @@
     <p:sldId id="280" r:id="rId5"/>
     <p:sldId id="281" r:id="rId6"/>
     <p:sldId id="282" r:id="rId7"/>
+    <p:sldId id="273" r:id="rId8"/>
+    <p:sldId id="274" r:id="rId9"/>
+    <p:sldId id="275" r:id="rId10"/>
+    <p:sldId id="276" r:id="rId11"/>
   </p:sldIdLst>
   <p:sldSz cx="12192000" cy="6858000"/>
   <p:notesSz cx="6858000" cy="9144000"/>
@@ -123,13 +127,65 @@
 <file path=ppt/revisionInfo.xml><?xml version="1.0" encoding="utf-8"?>
 <p1510:revInfo xmlns:a="http://schemas.openxmlformats.org/drawingml/2006/main" xmlns:r="http://schemas.openxmlformats.org/officeDocument/2006/relationships" xmlns:p1510="http://schemas.microsoft.com/office/powerpoint/2015/10/main">
   <p1510:revLst>
-    <p1510:client id="{A761AB05-66D5-4B97-8E12-7FFDAB65DEFF}" v="314" dt="2022-11-01T14:50:51.138"/>
+    <p1510:client id="{4EA16B51-BD4D-438E-8610-2F766D738BEC}" v="6" dt="2022-11-04T20:53:53.474"/>
   </p1510:revLst>
 </p1510:revInfo>
 </file>
 
 <file path=ppt/changesInfos/changesInfo1.xml><?xml version="1.0" encoding="utf-8"?>
 <pc:chgInfo xmlns:a="http://schemas.openxmlformats.org/drawingml/2006/main" xmlns:r="http://schemas.openxmlformats.org/officeDocument/2006/relationships" xmlns:ac="http://schemas.microsoft.com/office/drawing/2013/main/command" xmlns:pc="http://schemas.microsoft.com/office/powerpoint/2013/main/command">
+  <pc:docChgLst>
+    <pc:chgData name="Gude,Manoj Kumar" userId="0e353df1-568e-4a01-a0b1-bd99741cd871" providerId="ADAL" clId="{4EA16B51-BD4D-438E-8610-2F766D738BEC}"/>
+    <pc:docChg chg="addSld modSld">
+      <pc:chgData name="Gude,Manoj Kumar" userId="0e353df1-568e-4a01-a0b1-bd99741cd871" providerId="ADAL" clId="{4EA16B51-BD4D-438E-8610-2F766D738BEC}" dt="2022-11-04T20:53:53.471" v="5"/>
+      <pc:docMkLst>
+        <pc:docMk/>
+      </pc:docMkLst>
+      <pc:sldChg chg="add">
+        <pc:chgData name="Gude,Manoj Kumar" userId="0e353df1-568e-4a01-a0b1-bd99741cd871" providerId="ADAL" clId="{4EA16B51-BD4D-438E-8610-2F766D738BEC}" dt="2022-11-04T20:53:25.760" v="2"/>
+        <pc:sldMkLst>
+          <pc:docMk/>
+          <pc:sldMk cId="1636084600" sldId="273"/>
+        </pc:sldMkLst>
+      </pc:sldChg>
+      <pc:sldChg chg="add">
+        <pc:chgData name="Gude,Manoj Kumar" userId="0e353df1-568e-4a01-a0b1-bd99741cd871" providerId="ADAL" clId="{4EA16B51-BD4D-438E-8610-2F766D738BEC}" dt="2022-11-04T20:53:35.688" v="3"/>
+        <pc:sldMkLst>
+          <pc:docMk/>
+          <pc:sldMk cId="257207380" sldId="274"/>
+        </pc:sldMkLst>
+      </pc:sldChg>
+      <pc:sldChg chg="add">
+        <pc:chgData name="Gude,Manoj Kumar" userId="0e353df1-568e-4a01-a0b1-bd99741cd871" providerId="ADAL" clId="{4EA16B51-BD4D-438E-8610-2F766D738BEC}" dt="2022-11-04T20:53:43.516" v="4"/>
+        <pc:sldMkLst>
+          <pc:docMk/>
+          <pc:sldMk cId="3074008843" sldId="275"/>
+        </pc:sldMkLst>
+      </pc:sldChg>
+      <pc:sldChg chg="add">
+        <pc:chgData name="Gude,Manoj Kumar" userId="0e353df1-568e-4a01-a0b1-bd99741cd871" providerId="ADAL" clId="{4EA16B51-BD4D-438E-8610-2F766D738BEC}" dt="2022-11-04T20:53:53.471" v="5"/>
+        <pc:sldMkLst>
+          <pc:docMk/>
+          <pc:sldMk cId="1554882151" sldId="276"/>
+        </pc:sldMkLst>
+      </pc:sldChg>
+      <pc:sldChg chg="addSp delSp modSp">
+        <pc:chgData name="Gude,Manoj Kumar" userId="0e353df1-568e-4a01-a0b1-bd99741cd871" providerId="ADAL" clId="{4EA16B51-BD4D-438E-8610-2F766D738BEC}" dt="2022-11-04T20:53:15.725" v="1"/>
+        <pc:sldMkLst>
+          <pc:docMk/>
+          <pc:sldMk cId="3997424871" sldId="282"/>
+        </pc:sldMkLst>
+        <pc:graphicFrameChg chg="add del mod">
+          <ac:chgData name="Gude,Manoj Kumar" userId="0e353df1-568e-4a01-a0b1-bd99741cd871" providerId="ADAL" clId="{4EA16B51-BD4D-438E-8610-2F766D738BEC}" dt="2022-11-04T20:53:15.725" v="1"/>
+          <ac:graphicFrameMkLst>
+            <pc:docMk/>
+            <pc:sldMk cId="3997424871" sldId="282"/>
+            <ac:graphicFrameMk id="6" creationId="{04968455-9BC9-42BE-EF51-CD4110AE420E}"/>
+          </ac:graphicFrameMkLst>
+        </pc:graphicFrameChg>
+      </pc:sldChg>
+    </pc:docChg>
+  </pc:docChgLst>
   <pc:docChgLst>
     <pc:chgData name="Mulakalapalli,Jaichand" userId="a3680caf-10e5-4540-ae62-1e7229e4db6c" providerId="ADAL" clId="{A761AB05-66D5-4B97-8E12-7FFDAB65DEFF}"/>
     <pc:docChg chg="undo redo custSel addSld delSld modSld">
@@ -11054,7 +11110,7 @@
           <a:p>
             <a:fld id="{1EA45B67-C1DB-4307-9BEE-F2562DE9CE1E}" type="datetimeFigureOut">
               <a:rPr lang="en-US" smtClean="0"/>
-              <a:t>11/3/2022</a:t>
+              <a:t>11/4/2022</a:t>
             </a:fld>
             <a:endParaRPr lang="en-US" dirty="0"/>
           </a:p>
@@ -11823,7 +11879,7 @@
           <a:p>
             <a:fld id="{6098FB83-EB5E-40DF-ABAD-7BFC07058507}" type="datetime1">
               <a:rPr lang="en-US" smtClean="0"/>
-              <a:t>11/3/2022</a:t>
+              <a:t>11/4/2022</a:t>
             </a:fld>
             <a:endParaRPr lang="en-US" dirty="0"/>
           </a:p>
@@ -12122,7 +12178,7 @@
           <a:p>
             <a:fld id="{88DC53B0-3D91-4BE1-801F-D1F0B71A5D2E}" type="datetime1">
               <a:rPr lang="en-US" smtClean="0"/>
-              <a:t>11/3/2022</a:t>
+              <a:t>11/4/2022</a:t>
             </a:fld>
             <a:endParaRPr lang="en-US" dirty="0"/>
           </a:p>
@@ -12374,7 +12430,7 @@
           <a:p>
             <a:fld id="{A4AF205C-3C42-4D8A-808A-61E6D651AD01}" type="datetime1">
               <a:rPr lang="en-US" smtClean="0"/>
-              <a:t>11/3/2022</a:t>
+              <a:t>11/4/2022</a:t>
             </a:fld>
             <a:endParaRPr lang="en-US" dirty="0"/>
           </a:p>
@@ -12918,7 +12974,7 @@
           <a:p>
             <a:fld id="{7C13827F-92A8-481F-BCE9-4D2455924279}" type="datetime1">
               <a:rPr lang="en-US" smtClean="0"/>
-              <a:t>11/3/2022</a:t>
+              <a:t>11/4/2022</a:t>
             </a:fld>
             <a:endParaRPr lang="en-US" dirty="0"/>
           </a:p>
@@ -13170,7 +13226,7 @@
           <a:p>
             <a:fld id="{5B7B5472-5AB3-492C-9CA0-80F7C2C6434F}" type="datetime1">
               <a:rPr lang="en-US" smtClean="0"/>
-              <a:t>11/3/2022</a:t>
+              <a:t>11/4/2022</a:t>
             </a:fld>
             <a:endParaRPr lang="en-US" dirty="0"/>
           </a:p>
@@ -13706,7 +13762,7 @@
           <a:p>
             <a:fld id="{6604AC4B-BD12-44D6-B3F7-CE22D69E0B07}" type="datetime1">
               <a:rPr lang="en-US" smtClean="0"/>
-              <a:t>11/3/2022</a:t>
+              <a:t>11/4/2022</a:t>
             </a:fld>
             <a:endParaRPr lang="en-US" dirty="0"/>
           </a:p>
@@ -14007,7 +14063,7 @@
           <a:p>
             <a:fld id="{77D76558-47D7-450A-88FE-1478D5F6BDC0}" type="datetime1">
               <a:rPr lang="en-US" smtClean="0"/>
-              <a:t>11/3/2022</a:t>
+              <a:t>11/4/2022</a:t>
             </a:fld>
             <a:endParaRPr lang="en-US" dirty="0"/>
           </a:p>
@@ -14185,7 +14241,7 @@
           <a:p>
             <a:fld id="{B46A8A9E-F03E-4951-B287-D66ABA86A57D}" type="datetime1">
               <a:rPr lang="en-US" smtClean="0"/>
-              <a:t>11/3/2022</a:t>
+              <a:t>11/4/2022</a:t>
             </a:fld>
             <a:endParaRPr lang="en-US" dirty="0"/>
           </a:p>
@@ -14369,7 +14425,7 @@
           <a:p>
             <a:fld id="{CF47EE95-5993-4EB0-9F3F-2DC27446FE03}" type="datetime1">
               <a:rPr lang="en-US" smtClean="0"/>
-              <a:t>11/3/2022</a:t>
+              <a:t>11/4/2022</a:t>
             </a:fld>
             <a:endParaRPr lang="en-US" dirty="0"/>
           </a:p>
@@ -14543,7 +14599,7 @@
           <a:p>
             <a:fld id="{9910D854-0271-49F3-AF1B-C290F32EE99E}" type="datetime1">
               <a:rPr lang="en-US" smtClean="0"/>
-              <a:t>11/3/2022</a:t>
+              <a:t>11/4/2022</a:t>
             </a:fld>
             <a:endParaRPr lang="en-US" dirty="0"/>
           </a:p>
@@ -14798,7 +14854,7 @@
           <a:p>
             <a:fld id="{1F0E8253-1AB4-4BE2-A1FB-4A81B903DD27}" type="datetime1">
               <a:rPr lang="en-US" smtClean="0"/>
-              <a:t>11/3/2022</a:t>
+              <a:t>11/4/2022</a:t>
             </a:fld>
             <a:endParaRPr lang="en-US" dirty="0"/>
           </a:p>
@@ -15099,7 +15155,7 @@
           <a:p>
             <a:fld id="{B8FC78F1-E3C0-49FE-8EBC-D31E5AE0CDE3}" type="datetime1">
               <a:rPr lang="en-US" smtClean="0"/>
-              <a:t>11/3/2022</a:t>
+              <a:t>11/4/2022</a:t>
             </a:fld>
             <a:endParaRPr lang="en-US" dirty="0"/>
           </a:p>
@@ -15545,7 +15601,7 @@
           <a:p>
             <a:fld id="{FF28074D-5828-4FB5-BC2A-4D6B0BAD4FD5}" type="datetime1">
               <a:rPr lang="en-US" smtClean="0"/>
-              <a:t>11/3/2022</a:t>
+              <a:t>11/4/2022</a:t>
             </a:fld>
             <a:endParaRPr lang="en-US" dirty="0"/>
           </a:p>
@@ -15667,7 +15723,7 @@
           <a:p>
             <a:fld id="{21F4C752-E4E1-4254-B675-AB30F9DA8FB7}" type="datetime1">
               <a:rPr lang="en-US" smtClean="0"/>
-              <a:t>11/3/2022</a:t>
+              <a:t>11/4/2022</a:t>
             </a:fld>
             <a:endParaRPr lang="en-US" dirty="0"/>
           </a:p>
@@ -15766,7 +15822,7 @@
           <a:p>
             <a:fld id="{6E792BD7-591B-4F90-A7A8-939932FED77D}" type="datetime1">
               <a:rPr lang="en-US" smtClean="0"/>
-              <a:t>11/3/2022</a:t>
+              <a:t>11/4/2022</a:t>
             </a:fld>
             <a:endParaRPr lang="en-US" dirty="0"/>
           </a:p>
@@ -16053,7 +16109,7 @@
           <a:p>
             <a:fld id="{469FAC2F-EE1A-41FF-8761-C3A859C5DF22}" type="datetime1">
               <a:rPr lang="en-US" smtClean="0"/>
-              <a:t>11/3/2022</a:t>
+              <a:t>11/4/2022</a:t>
             </a:fld>
             <a:endParaRPr lang="en-US" dirty="0"/>
           </a:p>
@@ -16347,7 +16403,7 @@
           <a:p>
             <a:fld id="{A9D710A1-601C-479D-869D-0440464DD367}" type="datetime1">
               <a:rPr lang="en-US" smtClean="0"/>
-              <a:t>11/3/2022</a:t>
+              <a:t>11/4/2022</a:t>
             </a:fld>
             <a:endParaRPr lang="en-US" dirty="0"/>
           </a:p>
@@ -16880,7 +16936,7 @@
           <a:p>
             <a:fld id="{C4E6002A-2A50-4B5E-ABDF-34E95FFCA441}" type="datetime1">
               <a:rPr lang="en-US" smtClean="0"/>
-              <a:t>11/3/2022</a:t>
+              <a:t>11/4/2022</a:t>
             </a:fld>
             <a:endParaRPr lang="en-US" dirty="0"/>
           </a:p>
@@ -18038,6 +18094,226 @@
 </p:sld>
 </file>
 
+<file path=ppt/slides/slide10.xml><?xml version="1.0" encoding="utf-8"?>
+<p:sld xmlns:a="http://schemas.openxmlformats.org/drawingml/2006/main" xmlns:r="http://schemas.openxmlformats.org/officeDocument/2006/relationships" xmlns:p="http://schemas.openxmlformats.org/presentationml/2006/main">
+  <p:cSld>
+    <p:spTree>
+      <p:nvGrpSpPr>
+        <p:cNvPr id="1" name=""/>
+        <p:cNvGrpSpPr/>
+        <p:nvPr/>
+      </p:nvGrpSpPr>
+      <p:grpSpPr>
+        <a:xfrm>
+          <a:off x="0" y="0"/>
+          <a:ext cx="0" cy="0"/>
+          <a:chOff x="0" y="0"/>
+          <a:chExt cx="0" cy="0"/>
+        </a:xfrm>
+      </p:grpSpPr>
+      <p:sp>
+        <p:nvSpPr>
+          <p:cNvPr id="2" name="Title 1">
+            <a:extLst>
+              <a:ext uri="{FF2B5EF4-FFF2-40B4-BE49-F238E27FC236}">
+                <a16:creationId xmlns:a16="http://schemas.microsoft.com/office/drawing/2014/main" id="{C3FA088A-2E86-F5E4-DA39-E90BE76F7E32}"/>
+              </a:ext>
+            </a:extLst>
+          </p:cNvPr>
+          <p:cNvSpPr>
+            <a:spLocks noGrp="1"/>
+          </p:cNvSpPr>
+          <p:nvPr>
+            <p:ph type="title"/>
+          </p:nvPr>
+        </p:nvSpPr>
+        <p:spPr/>
+        <p:txBody>
+          <a:bodyPr/>
+          <a:lstStyle/>
+          <a:p>
+            <a:r>
+              <a:rPr lang="en-US" dirty="0"/>
+              <a:t>Recycler View(in XML)</a:t>
+            </a:r>
+          </a:p>
+        </p:txBody>
+      </p:sp>
+      <p:sp>
+        <p:nvSpPr>
+          <p:cNvPr id="3" name="Content Placeholder 2">
+            <a:extLst>
+              <a:ext uri="{FF2B5EF4-FFF2-40B4-BE49-F238E27FC236}">
+                <a16:creationId xmlns:a16="http://schemas.microsoft.com/office/drawing/2014/main" id="{7A21C3D8-FD5E-0D0E-E6E9-2753F793A37F}"/>
+              </a:ext>
+            </a:extLst>
+          </p:cNvPr>
+          <p:cNvSpPr>
+            <a:spLocks noGrp="1"/>
+          </p:cNvSpPr>
+          <p:nvPr>
+            <p:ph idx="1"/>
+          </p:nvPr>
+        </p:nvSpPr>
+        <p:spPr/>
+        <p:txBody>
+          <a:bodyPr/>
+          <a:lstStyle/>
+          <a:p>
+            <a:pPr marL="0" indent="0">
+              <a:buNone/>
+            </a:pPr>
+            <a:r>
+              <a:rPr lang="en-US" b="0" i="0" dirty="0">
+                <a:solidFill>
+                  <a:srgbClr val="202124"/>
+                </a:solidFill>
+                <a:effectLst/>
+              </a:rPr>
+              <a:t>To implement a basic RecyclerView three sub-parts are needed .They are:</a:t>
+            </a:r>
+          </a:p>
+          <a:p>
+            <a:pPr lvl="1"/>
+            <a:r>
+              <a:rPr lang="en-US" sz="2200" b="1" i="0" dirty="0">
+                <a:solidFill>
+                  <a:srgbClr val="202124"/>
+                </a:solidFill>
+                <a:effectLst/>
+              </a:rPr>
+              <a:t>Card Layout: </a:t>
+            </a:r>
+            <a:r>
+              <a:rPr lang="en-US" sz="2200" b="0" i="0" dirty="0">
+                <a:solidFill>
+                  <a:srgbClr val="202124"/>
+                </a:solidFill>
+                <a:effectLst/>
+              </a:rPr>
+              <a:t>The card layout is an XML layout which will be treated as an item for the list created by the RecyclerView.</a:t>
+            </a:r>
+          </a:p>
+          <a:p>
+            <a:pPr lvl="1"/>
+            <a:r>
+              <a:rPr lang="en-US" sz="2200" b="1" i="0" dirty="0">
+                <a:solidFill>
+                  <a:srgbClr val="202124"/>
+                </a:solidFill>
+                <a:effectLst/>
+              </a:rPr>
+              <a:t>ViewHolder:</a:t>
+            </a:r>
+            <a:r>
+              <a:rPr lang="en-US" sz="2200" b="0" i="0" dirty="0">
+                <a:solidFill>
+                  <a:srgbClr val="202124"/>
+                </a:solidFill>
+                <a:effectLst/>
+              </a:rPr>
+              <a:t> The ViewHolder is a java class that stores the reference to the card layout views that have to be dynamically modified during the execution of the program by a list of data obtained either by online databases or added in some other way.</a:t>
+            </a:r>
+          </a:p>
+          <a:p>
+            <a:pPr lvl="1"/>
+            <a:r>
+              <a:rPr lang="en-US" sz="2200" b="1" i="0" dirty="0">
+                <a:solidFill>
+                  <a:srgbClr val="202124"/>
+                </a:solidFill>
+                <a:effectLst/>
+              </a:rPr>
+              <a:t>Data Class: </a:t>
+            </a:r>
+            <a:r>
+              <a:rPr lang="en-US" sz="2200" b="0" i="0" dirty="0">
+                <a:solidFill>
+                  <a:srgbClr val="202124"/>
+                </a:solidFill>
+                <a:effectLst/>
+              </a:rPr>
+              <a:t>The Data class is a custom java class that acts as a structure for holding the information for every item of the RecyclerView.</a:t>
+            </a:r>
+          </a:p>
+        </p:txBody>
+      </p:sp>
+      <p:sp>
+        <p:nvSpPr>
+          <p:cNvPr id="4" name="Footer Placeholder 3">
+            <a:extLst>
+              <a:ext uri="{FF2B5EF4-FFF2-40B4-BE49-F238E27FC236}">
+                <a16:creationId xmlns:a16="http://schemas.microsoft.com/office/drawing/2014/main" id="{1CD63212-774C-6FC7-D4D1-C1A1614D7226}"/>
+              </a:ext>
+            </a:extLst>
+          </p:cNvPr>
+          <p:cNvSpPr>
+            <a:spLocks noGrp="1"/>
+          </p:cNvSpPr>
+          <p:nvPr>
+            <p:ph type="ftr" sz="quarter" idx="11"/>
+          </p:nvPr>
+        </p:nvSpPr>
+        <p:spPr>
+          <a:xfrm>
+            <a:off x="2259013" y="6248398"/>
+            <a:ext cx="7084177" cy="365125"/>
+          </a:xfrm>
+        </p:spPr>
+        <p:txBody>
+          <a:bodyPr/>
+          <a:lstStyle/>
+          <a:p>
+            <a:r>
+              <a:rPr lang="en-US" b="1" dirty="0"/>
+              <a:t>Presenter: Manoj Kumar Gude</a:t>
+            </a:r>
+            <a:endParaRPr lang="en-US" dirty="0"/>
+          </a:p>
+        </p:txBody>
+      </p:sp>
+      <p:sp>
+        <p:nvSpPr>
+          <p:cNvPr id="5" name="Slide Number Placeholder 4">
+            <a:extLst>
+              <a:ext uri="{FF2B5EF4-FFF2-40B4-BE49-F238E27FC236}">
+                <a16:creationId xmlns:a16="http://schemas.microsoft.com/office/drawing/2014/main" id="{C5A23534-DEED-6C84-721E-1871EB173A97}"/>
+              </a:ext>
+            </a:extLst>
+          </p:cNvPr>
+          <p:cNvSpPr>
+            <a:spLocks noGrp="1"/>
+          </p:cNvSpPr>
+          <p:nvPr>
+            <p:ph type="sldNum" sz="quarter" idx="12"/>
+          </p:nvPr>
+        </p:nvSpPr>
+        <p:spPr/>
+        <p:txBody>
+          <a:bodyPr/>
+          <a:lstStyle/>
+          <a:p>
+            <a:fld id="{EE0D7808-EC4E-46D2-ABA0-EA3F9AF1A2E3}" type="slidenum">
+              <a:rPr lang="en-US" smtClean="0"/>
+              <a:t>10</a:t>
+            </a:fld>
+            <a:endParaRPr lang="en-US" dirty="0"/>
+          </a:p>
+        </p:txBody>
+      </p:sp>
+    </p:spTree>
+    <p:extLst>
+      <p:ext uri="{BB962C8B-B14F-4D97-AF65-F5344CB8AC3E}">
+        <p14:creationId xmlns:p14="http://schemas.microsoft.com/office/powerpoint/2010/main" val="1554882151"/>
+      </p:ext>
+    </p:extLst>
+  </p:cSld>
+  <p:clrMapOvr>
+    <a:masterClrMapping/>
+  </p:clrMapOvr>
+</p:sld>
+</file>
+
 <file path=ppt/slides/slide2.xml><?xml version="1.0" encoding="utf-8"?>
 <p:sld xmlns:a="http://schemas.openxmlformats.org/drawingml/2006/main" xmlns:r="http://schemas.openxmlformats.org/officeDocument/2006/relationships" xmlns:p="http://schemas.openxmlformats.org/presentationml/2006/main">
   <p:cSld>
@@ -18934,6 +19210,735 @@
     <p:extLst>
       <p:ext uri="{BB962C8B-B14F-4D97-AF65-F5344CB8AC3E}">
         <p14:creationId xmlns:p14="http://schemas.microsoft.com/office/powerpoint/2010/main" val="3997424871"/>
+      </p:ext>
+    </p:extLst>
+  </p:cSld>
+  <p:clrMapOvr>
+    <a:masterClrMapping/>
+  </p:clrMapOvr>
+</p:sld>
+</file>
+
+<file path=ppt/slides/slide7.xml><?xml version="1.0" encoding="utf-8"?>
+<p:sld xmlns:a="http://schemas.openxmlformats.org/drawingml/2006/main" xmlns:r="http://schemas.openxmlformats.org/officeDocument/2006/relationships" xmlns:p="http://schemas.openxmlformats.org/presentationml/2006/main">
+  <p:cSld>
+    <p:spTree>
+      <p:nvGrpSpPr>
+        <p:cNvPr id="1" name=""/>
+        <p:cNvGrpSpPr/>
+        <p:nvPr/>
+      </p:nvGrpSpPr>
+      <p:grpSpPr>
+        <a:xfrm>
+          <a:off x="0" y="0"/>
+          <a:ext cx="0" cy="0"/>
+          <a:chOff x="0" y="0"/>
+          <a:chExt cx="0" cy="0"/>
+        </a:xfrm>
+      </p:grpSpPr>
+      <p:sp>
+        <p:nvSpPr>
+          <p:cNvPr id="2" name="Title 1">
+            <a:extLst>
+              <a:ext uri="{FF2B5EF4-FFF2-40B4-BE49-F238E27FC236}">
+                <a16:creationId xmlns:a16="http://schemas.microsoft.com/office/drawing/2014/main" id="{F14E8938-A5C5-DF5A-B9E6-CB148B5236F7}"/>
+              </a:ext>
+            </a:extLst>
+          </p:cNvPr>
+          <p:cNvSpPr>
+            <a:spLocks noGrp="1"/>
+          </p:cNvSpPr>
+          <p:nvPr>
+            <p:ph type="title"/>
+          </p:nvPr>
+        </p:nvSpPr>
+        <p:spPr/>
+        <p:txBody>
+          <a:bodyPr/>
+          <a:lstStyle/>
+          <a:p>
+            <a:r>
+              <a:rPr lang="en-US" dirty="0"/>
+              <a:t>Action Bar (Navigation Bar)</a:t>
+            </a:r>
+          </a:p>
+        </p:txBody>
+      </p:sp>
+      <p:sp>
+        <p:nvSpPr>
+          <p:cNvPr id="3" name="Content Placeholder 2">
+            <a:extLst>
+              <a:ext uri="{FF2B5EF4-FFF2-40B4-BE49-F238E27FC236}">
+                <a16:creationId xmlns:a16="http://schemas.microsoft.com/office/drawing/2014/main" id="{9C9C5096-9EA3-714E-05C0-F6EC2BE23699}"/>
+              </a:ext>
+            </a:extLst>
+          </p:cNvPr>
+          <p:cNvSpPr>
+            <a:spLocks noGrp="1"/>
+          </p:cNvSpPr>
+          <p:nvPr>
+            <p:ph idx="1"/>
+          </p:nvPr>
+        </p:nvSpPr>
+        <p:spPr/>
+        <p:txBody>
+          <a:bodyPr/>
+          <a:lstStyle/>
+          <a:p>
+            <a:r>
+              <a:rPr lang="en-US" dirty="0"/>
+              <a:t>An Action Bar is a piece of dedicated real estate that appears at the top of each screen (usually). </a:t>
+            </a:r>
+          </a:p>
+          <a:p>
+            <a:r>
+              <a:rPr lang="en-US" dirty="0"/>
+              <a:t>It provides a place to display: </a:t>
+            </a:r>
+          </a:p>
+          <a:p>
+            <a:pPr lvl="1"/>
+            <a:r>
+              <a:rPr lang="en-US" sz="2200" dirty="0"/>
+              <a:t>Navigational controls (to drill down into hierarchical data) .</a:t>
+            </a:r>
+          </a:p>
+          <a:p>
+            <a:pPr lvl="1"/>
+            <a:r>
+              <a:rPr lang="en-US" sz="2200" dirty="0"/>
+              <a:t>Controls to support switching from one view to another.</a:t>
+            </a:r>
+          </a:p>
+          <a:p>
+            <a:pPr lvl="1"/>
+            <a:r>
+              <a:rPr lang="en-US" sz="2200" dirty="0"/>
+              <a:t>Your app's icon, a good branding opportunity. </a:t>
+            </a:r>
+          </a:p>
+          <a:p>
+            <a:pPr lvl="1"/>
+            <a:r>
+              <a:rPr lang="en-US" sz="2200" dirty="0"/>
+              <a:t>A way of indicating your user’s location within the app.</a:t>
+            </a:r>
+          </a:p>
+        </p:txBody>
+      </p:sp>
+      <p:sp>
+        <p:nvSpPr>
+          <p:cNvPr id="4" name="Footer Placeholder 3">
+            <a:extLst>
+              <a:ext uri="{FF2B5EF4-FFF2-40B4-BE49-F238E27FC236}">
+                <a16:creationId xmlns:a16="http://schemas.microsoft.com/office/drawing/2014/main" id="{D61399B8-24D2-8AA5-BBD7-5B891154AB56}"/>
+              </a:ext>
+            </a:extLst>
+          </p:cNvPr>
+          <p:cNvSpPr>
+            <a:spLocks noGrp="1"/>
+          </p:cNvSpPr>
+          <p:nvPr>
+            <p:ph type="ftr" sz="quarter" idx="11"/>
+          </p:nvPr>
+        </p:nvSpPr>
+        <p:spPr/>
+        <p:txBody>
+          <a:bodyPr/>
+          <a:lstStyle/>
+          <a:p>
+            <a:r>
+              <a:rPr lang="en-US" b="1" dirty="0"/>
+              <a:t>Presenter: Manoj Kumar Gude </a:t>
+            </a:r>
+            <a:endParaRPr lang="en-US" dirty="0"/>
+          </a:p>
+        </p:txBody>
+      </p:sp>
+      <p:sp>
+        <p:nvSpPr>
+          <p:cNvPr id="5" name="Slide Number Placeholder 4">
+            <a:extLst>
+              <a:ext uri="{FF2B5EF4-FFF2-40B4-BE49-F238E27FC236}">
+                <a16:creationId xmlns:a16="http://schemas.microsoft.com/office/drawing/2014/main" id="{77B6FC5D-5C65-2D04-7FDC-29493444421D}"/>
+              </a:ext>
+            </a:extLst>
+          </p:cNvPr>
+          <p:cNvSpPr>
+            <a:spLocks noGrp="1"/>
+          </p:cNvSpPr>
+          <p:nvPr>
+            <p:ph type="sldNum" sz="quarter" idx="12"/>
+          </p:nvPr>
+        </p:nvSpPr>
+        <p:spPr/>
+        <p:txBody>
+          <a:bodyPr/>
+          <a:lstStyle/>
+          <a:p>
+            <a:fld id="{EE0D7808-EC4E-46D2-ABA0-EA3F9AF1A2E3}" type="slidenum">
+              <a:rPr lang="en-US" smtClean="0"/>
+              <a:t>7</a:t>
+            </a:fld>
+            <a:endParaRPr lang="en-US" dirty="0"/>
+          </a:p>
+        </p:txBody>
+      </p:sp>
+    </p:spTree>
+    <p:extLst>
+      <p:ext uri="{BB962C8B-B14F-4D97-AF65-F5344CB8AC3E}">
+        <p14:creationId xmlns:p14="http://schemas.microsoft.com/office/powerpoint/2010/main" val="1636084600"/>
+      </p:ext>
+    </p:extLst>
+  </p:cSld>
+  <p:clrMapOvr>
+    <a:masterClrMapping/>
+  </p:clrMapOvr>
+</p:sld>
+</file>
+
+<file path=ppt/slides/slide8.xml><?xml version="1.0" encoding="utf-8"?>
+<p:sld xmlns:a="http://schemas.openxmlformats.org/drawingml/2006/main" xmlns:r="http://schemas.openxmlformats.org/officeDocument/2006/relationships" xmlns:p="http://schemas.openxmlformats.org/presentationml/2006/main">
+  <p:cSld>
+    <p:spTree>
+      <p:nvGrpSpPr>
+        <p:cNvPr id="1" name=""/>
+        <p:cNvGrpSpPr/>
+        <p:nvPr/>
+      </p:nvGrpSpPr>
+      <p:grpSpPr>
+        <a:xfrm>
+          <a:off x="0" y="0"/>
+          <a:ext cx="0" cy="0"/>
+          <a:chOff x="0" y="0"/>
+          <a:chExt cx="0" cy="0"/>
+        </a:xfrm>
+      </p:grpSpPr>
+      <p:sp>
+        <p:nvSpPr>
+          <p:cNvPr id="2" name="Title 1">
+            <a:extLst>
+              <a:ext uri="{FF2B5EF4-FFF2-40B4-BE49-F238E27FC236}">
+                <a16:creationId xmlns:a16="http://schemas.microsoft.com/office/drawing/2014/main" id="{1FDC7968-6812-A4CE-D010-C48E14586234}"/>
+              </a:ext>
+            </a:extLst>
+          </p:cNvPr>
+          <p:cNvSpPr>
+            <a:spLocks noGrp="1"/>
+          </p:cNvSpPr>
+          <p:nvPr>
+            <p:ph type="title"/>
+          </p:nvPr>
+        </p:nvSpPr>
+        <p:spPr/>
+        <p:txBody>
+          <a:bodyPr/>
+          <a:lstStyle/>
+          <a:p>
+            <a:r>
+              <a:rPr lang="en-US" dirty="0"/>
+              <a:t>Action Bar(Navigation Bar)</a:t>
+            </a:r>
+          </a:p>
+        </p:txBody>
+      </p:sp>
+      <p:sp>
+        <p:nvSpPr>
+          <p:cNvPr id="3" name="Content Placeholder 2">
+            <a:extLst>
+              <a:ext uri="{FF2B5EF4-FFF2-40B4-BE49-F238E27FC236}">
+                <a16:creationId xmlns:a16="http://schemas.microsoft.com/office/drawing/2014/main" id="{3B7AD886-35E9-D02A-13CE-5E62047B7713}"/>
+              </a:ext>
+            </a:extLst>
+          </p:cNvPr>
+          <p:cNvSpPr>
+            <a:spLocks noGrp="1"/>
+          </p:cNvSpPr>
+          <p:nvPr>
+            <p:ph idx="1"/>
+          </p:nvPr>
+        </p:nvSpPr>
+        <p:spPr>
+          <a:xfrm>
+            <a:off x="1484310" y="1781176"/>
+            <a:ext cx="8259130" cy="1152524"/>
+          </a:xfrm>
+        </p:spPr>
+        <p:txBody>
+          <a:bodyPr/>
+          <a:lstStyle/>
+          <a:p>
+            <a:r>
+              <a:rPr lang="en-US" dirty="0"/>
+              <a:t> App icon (including an "up caret") (indicated by the 1) .</a:t>
+            </a:r>
+          </a:p>
+          <a:p>
+            <a:r>
+              <a:rPr lang="en-US" dirty="0"/>
+              <a:t>Place for drop-down menu or tabs to switch among screens </a:t>
+            </a:r>
+          </a:p>
+        </p:txBody>
+      </p:sp>
+      <p:sp>
+        <p:nvSpPr>
+          <p:cNvPr id="4" name="Footer Placeholder 3">
+            <a:extLst>
+              <a:ext uri="{FF2B5EF4-FFF2-40B4-BE49-F238E27FC236}">
+                <a16:creationId xmlns:a16="http://schemas.microsoft.com/office/drawing/2014/main" id="{97C8FE79-58F1-B5E9-2C5D-5F4C44ADC889}"/>
+              </a:ext>
+            </a:extLst>
+          </p:cNvPr>
+          <p:cNvSpPr>
+            <a:spLocks noGrp="1"/>
+          </p:cNvSpPr>
+          <p:nvPr>
+            <p:ph type="ftr" sz="quarter" idx="11"/>
+          </p:nvPr>
+        </p:nvSpPr>
+        <p:spPr/>
+        <p:txBody>
+          <a:bodyPr/>
+          <a:lstStyle/>
+          <a:p>
+            <a:r>
+              <a:rPr lang="en-US" b="1" dirty="0"/>
+              <a:t>Presenter: Manoj Kumar Gude </a:t>
+            </a:r>
+            <a:endParaRPr lang="en-US" dirty="0"/>
+          </a:p>
+        </p:txBody>
+      </p:sp>
+      <p:sp>
+        <p:nvSpPr>
+          <p:cNvPr id="5" name="Slide Number Placeholder 4">
+            <a:extLst>
+              <a:ext uri="{FF2B5EF4-FFF2-40B4-BE49-F238E27FC236}">
+                <a16:creationId xmlns:a16="http://schemas.microsoft.com/office/drawing/2014/main" id="{CA61F84E-B606-FA22-7664-9EFCD22C8113}"/>
+              </a:ext>
+            </a:extLst>
+          </p:cNvPr>
+          <p:cNvSpPr>
+            <a:spLocks noGrp="1"/>
+          </p:cNvSpPr>
+          <p:nvPr>
+            <p:ph type="sldNum" sz="quarter" idx="12"/>
+          </p:nvPr>
+        </p:nvSpPr>
+        <p:spPr/>
+        <p:txBody>
+          <a:bodyPr/>
+          <a:lstStyle/>
+          <a:p>
+            <a:fld id="{EE0D7808-EC4E-46D2-ABA0-EA3F9AF1A2E3}" type="slidenum">
+              <a:rPr lang="en-US" smtClean="0"/>
+              <a:t>8</a:t>
+            </a:fld>
+            <a:endParaRPr lang="en-US" dirty="0"/>
+          </a:p>
+        </p:txBody>
+      </p:sp>
+      <p:sp>
+        <p:nvSpPr>
+          <p:cNvPr id="8" name="TextBox 7">
+            <a:extLst>
+              <a:ext uri="{FF2B5EF4-FFF2-40B4-BE49-F238E27FC236}">
+                <a16:creationId xmlns:a16="http://schemas.microsoft.com/office/drawing/2014/main" id="{ABC59E9A-32FC-07A9-CE06-ACC7044F0B88}"/>
+              </a:ext>
+            </a:extLst>
+          </p:cNvPr>
+          <p:cNvSpPr txBox="1"/>
+          <p:nvPr/>
+        </p:nvSpPr>
+        <p:spPr>
+          <a:xfrm>
+            <a:off x="1484310" y="2933700"/>
+            <a:ext cx="5487991" cy="2979277"/>
+          </a:xfrm>
+          <a:prstGeom prst="rect">
+            <a:avLst/>
+          </a:prstGeom>
+          <a:noFill/>
+        </p:spPr>
+        <p:txBody>
+          <a:bodyPr wrap="square">
+            <a:spAutoFit/>
+          </a:bodyPr>
+          <a:lstStyle/>
+          <a:p>
+            <a:pPr marL="285750" indent="-285750">
+              <a:spcBef>
+                <a:spcPct val="20000"/>
+              </a:spcBef>
+              <a:spcAft>
+                <a:spcPts val="600"/>
+              </a:spcAft>
+              <a:buClr>
+                <a:schemeClr val="accent1">
+                  <a:lumMod val="75000"/>
+                </a:schemeClr>
+              </a:buClr>
+              <a:buSzPct val="145000"/>
+              <a:buFont typeface="Arial"/>
+              <a:buChar char="•"/>
+            </a:pPr>
+            <a:r>
+              <a:rPr lang="en-US" sz="2400" dirty="0"/>
+              <a:t>If your app doesn't require navigational controls, could also display the app name.</a:t>
+            </a:r>
+          </a:p>
+          <a:p>
+            <a:pPr marL="285750" indent="-285750">
+              <a:spcBef>
+                <a:spcPct val="20000"/>
+              </a:spcBef>
+              <a:spcAft>
+                <a:spcPts val="600"/>
+              </a:spcAft>
+              <a:buClr>
+                <a:schemeClr val="accent1">
+                  <a:lumMod val="75000"/>
+                </a:schemeClr>
+              </a:buClr>
+              <a:buSzPct val="145000"/>
+              <a:buFont typeface="Arial"/>
+              <a:buChar char="•"/>
+            </a:pPr>
+            <a:r>
+              <a:rPr lang="en-US" sz="2400" dirty="0"/>
+              <a:t>Action buttons (text, icons, or a combination thereof). </a:t>
+            </a:r>
+          </a:p>
+          <a:p>
+            <a:pPr marL="285750" indent="-285750">
+              <a:spcBef>
+                <a:spcPct val="20000"/>
+              </a:spcBef>
+              <a:spcAft>
+                <a:spcPts val="600"/>
+              </a:spcAft>
+              <a:buClr>
+                <a:schemeClr val="accent1">
+                  <a:lumMod val="75000"/>
+                </a:schemeClr>
+              </a:buClr>
+              <a:buSzPct val="145000"/>
+              <a:buFont typeface="Arial"/>
+              <a:buChar char="•"/>
+            </a:pPr>
+            <a:r>
+              <a:rPr lang="en-US" sz="2400" dirty="0"/>
+              <a:t>Action overflow, for infrequently used actions.</a:t>
+            </a:r>
+          </a:p>
+        </p:txBody>
+      </p:sp>
+      <p:grpSp>
+        <p:nvGrpSpPr>
+          <p:cNvPr id="10" name="Group 9">
+            <a:extLst>
+              <a:ext uri="{FF2B5EF4-FFF2-40B4-BE49-F238E27FC236}">
+                <a16:creationId xmlns:a16="http://schemas.microsoft.com/office/drawing/2014/main" id="{D7ADF1CF-FA81-D9C8-036D-6EE0B092D8F3}"/>
+              </a:ext>
+            </a:extLst>
+          </p:cNvPr>
+          <p:cNvGrpSpPr/>
+          <p:nvPr/>
+        </p:nvGrpSpPr>
+        <p:grpSpPr>
+          <a:xfrm>
+            <a:off x="6493667" y="3386226"/>
+            <a:ext cx="4517813" cy="1261879"/>
+            <a:chOff x="6493667" y="3386226"/>
+            <a:chExt cx="4517813" cy="1261879"/>
+          </a:xfrm>
+        </p:grpSpPr>
+        <p:pic>
+          <p:nvPicPr>
+            <p:cNvPr id="6" name="Picture 5">
+              <a:extLst>
+                <a:ext uri="{FF2B5EF4-FFF2-40B4-BE49-F238E27FC236}">
+                  <a16:creationId xmlns:a16="http://schemas.microsoft.com/office/drawing/2014/main" id="{FF7A541D-E6C8-468D-3CFC-83EDBCF2079A}"/>
+                </a:ext>
+              </a:extLst>
+            </p:cNvPr>
+            <p:cNvPicPr>
+              <a:picLocks noChangeAspect="1"/>
+            </p:cNvPicPr>
+            <p:nvPr/>
+          </p:nvPicPr>
+          <p:blipFill>
+            <a:blip r:embed="rId2"/>
+            <a:stretch>
+              <a:fillRect/>
+            </a:stretch>
+          </p:blipFill>
+          <p:spPr>
+            <a:xfrm>
+              <a:off x="6493667" y="3386226"/>
+              <a:ext cx="4517813" cy="880974"/>
+            </a:xfrm>
+            <a:prstGeom prst="rect">
+              <a:avLst/>
+            </a:prstGeom>
+          </p:spPr>
+        </p:pic>
+        <p:sp>
+          <p:nvSpPr>
+            <p:cNvPr id="9" name="TextBox 8">
+              <a:extLst>
+                <a:ext uri="{FF2B5EF4-FFF2-40B4-BE49-F238E27FC236}">
+                  <a16:creationId xmlns:a16="http://schemas.microsoft.com/office/drawing/2014/main" id="{7341E338-98FD-5875-DA82-050AC6B127FC}"/>
+                </a:ext>
+              </a:extLst>
+            </p:cNvPr>
+            <p:cNvSpPr txBox="1"/>
+            <p:nvPr/>
+          </p:nvSpPr>
+          <p:spPr>
+            <a:xfrm>
+              <a:off x="7331350" y="4278773"/>
+              <a:ext cx="2956259" cy="369332"/>
+            </a:xfrm>
+            <a:prstGeom prst="rect">
+              <a:avLst/>
+            </a:prstGeom>
+            <a:noFill/>
+          </p:spPr>
+          <p:txBody>
+            <a:bodyPr wrap="none" rtlCol="0">
+              <a:spAutoFit/>
+            </a:bodyPr>
+            <a:lstStyle/>
+            <a:p>
+              <a:r>
+                <a:rPr lang="en-US" b="1" dirty="0"/>
+                <a:t>Fig 1: </a:t>
+              </a:r>
+              <a:r>
+                <a:rPr lang="en-US" dirty="0"/>
+                <a:t>Sample Navigation Bar</a:t>
+              </a:r>
+            </a:p>
+          </p:txBody>
+        </p:sp>
+      </p:grpSp>
+    </p:spTree>
+    <p:extLst>
+      <p:ext uri="{BB962C8B-B14F-4D97-AF65-F5344CB8AC3E}">
+        <p14:creationId xmlns:p14="http://schemas.microsoft.com/office/powerpoint/2010/main" val="257207380"/>
+      </p:ext>
+    </p:extLst>
+  </p:cSld>
+  <p:clrMapOvr>
+    <a:masterClrMapping/>
+  </p:clrMapOvr>
+</p:sld>
+</file>
+
+<file path=ppt/slides/slide9.xml><?xml version="1.0" encoding="utf-8"?>
+<p:sld xmlns:a="http://schemas.openxmlformats.org/drawingml/2006/main" xmlns:r="http://schemas.openxmlformats.org/officeDocument/2006/relationships" xmlns:p="http://schemas.openxmlformats.org/presentationml/2006/main">
+  <p:cSld>
+    <p:spTree>
+      <p:nvGrpSpPr>
+        <p:cNvPr id="1" name=""/>
+        <p:cNvGrpSpPr/>
+        <p:nvPr/>
+      </p:nvGrpSpPr>
+      <p:grpSpPr>
+        <a:xfrm>
+          <a:off x="0" y="0"/>
+          <a:ext cx="0" cy="0"/>
+          <a:chOff x="0" y="0"/>
+          <a:chExt cx="0" cy="0"/>
+        </a:xfrm>
+      </p:grpSpPr>
+      <p:sp>
+        <p:nvSpPr>
+          <p:cNvPr id="2" name="Title 1">
+            <a:extLst>
+              <a:ext uri="{FF2B5EF4-FFF2-40B4-BE49-F238E27FC236}">
+                <a16:creationId xmlns:a16="http://schemas.microsoft.com/office/drawing/2014/main" id="{C3FA088A-2E86-F5E4-DA39-E90BE76F7E32}"/>
+              </a:ext>
+            </a:extLst>
+          </p:cNvPr>
+          <p:cNvSpPr>
+            <a:spLocks noGrp="1"/>
+          </p:cNvSpPr>
+          <p:nvPr>
+            <p:ph type="title"/>
+          </p:nvPr>
+        </p:nvSpPr>
+        <p:spPr/>
+        <p:txBody>
+          <a:bodyPr/>
+          <a:lstStyle/>
+          <a:p>
+            <a:r>
+              <a:rPr lang="en-US" dirty="0"/>
+              <a:t>Recycler View(in XML)</a:t>
+            </a:r>
+          </a:p>
+        </p:txBody>
+      </p:sp>
+      <p:sp>
+        <p:nvSpPr>
+          <p:cNvPr id="3" name="Content Placeholder 2">
+            <a:extLst>
+              <a:ext uri="{FF2B5EF4-FFF2-40B4-BE49-F238E27FC236}">
+                <a16:creationId xmlns:a16="http://schemas.microsoft.com/office/drawing/2014/main" id="{7A21C3D8-FD5E-0D0E-E6E9-2753F793A37F}"/>
+              </a:ext>
+            </a:extLst>
+          </p:cNvPr>
+          <p:cNvSpPr>
+            <a:spLocks noGrp="1"/>
+          </p:cNvSpPr>
+          <p:nvPr>
+            <p:ph idx="1"/>
+          </p:nvPr>
+        </p:nvSpPr>
+        <p:spPr/>
+        <p:txBody>
+          <a:bodyPr/>
+          <a:lstStyle/>
+          <a:p>
+            <a:r>
+              <a:rPr lang="en-US" b="0" i="0" dirty="0">
+                <a:solidFill>
+                  <a:srgbClr val="202124"/>
+                </a:solidFill>
+                <a:effectLst/>
+              </a:rPr>
+              <a:t>RecyclerView makes it easy to efficiently display large sets of data. </a:t>
+            </a:r>
+          </a:p>
+          <a:p>
+            <a:r>
+              <a:rPr lang="en-US" b="0" i="0" dirty="0">
+                <a:solidFill>
+                  <a:srgbClr val="202124"/>
+                </a:solidFill>
+                <a:effectLst/>
+              </a:rPr>
+              <a:t>As the name implies, RecyclerView </a:t>
+            </a:r>
+            <a:r>
+              <a:rPr lang="en-US" b="0" i="1" dirty="0">
+                <a:solidFill>
+                  <a:srgbClr val="202124"/>
+                </a:solidFill>
+                <a:effectLst/>
+              </a:rPr>
+              <a:t>recycles</a:t>
+            </a:r>
+            <a:r>
+              <a:rPr lang="en-US" b="0" i="0" dirty="0">
+                <a:solidFill>
+                  <a:srgbClr val="202124"/>
+                </a:solidFill>
+                <a:effectLst/>
+              </a:rPr>
+              <a:t> those individual elements.</a:t>
+            </a:r>
+          </a:p>
+          <a:p>
+            <a:r>
+              <a:rPr lang="en-US" b="0" i="0" dirty="0">
+                <a:solidFill>
+                  <a:srgbClr val="202124"/>
+                </a:solidFill>
+                <a:effectLst/>
+              </a:rPr>
+              <a:t> When an item scrolls off the screen, RecyclerView doesn't destroy its view. Instead, RecyclerView reuses the view for new items that have scrolled onscreen.</a:t>
+            </a:r>
+            <a:endParaRPr lang="en-US" dirty="0">
+              <a:solidFill>
+                <a:srgbClr val="202124"/>
+              </a:solidFill>
+            </a:endParaRPr>
+          </a:p>
+          <a:p>
+            <a:r>
+              <a:rPr lang="en-US" b="0" i="0" dirty="0">
+                <a:solidFill>
+                  <a:srgbClr val="202124"/>
+                </a:solidFill>
+                <a:effectLst/>
+              </a:rPr>
+              <a:t> This reuse vastly improves performance, improving your app's responsiveness and reducing power consumption.</a:t>
+            </a:r>
+            <a:endParaRPr lang="en-US" dirty="0"/>
+          </a:p>
+        </p:txBody>
+      </p:sp>
+      <p:sp>
+        <p:nvSpPr>
+          <p:cNvPr id="4" name="Footer Placeholder 3">
+            <a:extLst>
+              <a:ext uri="{FF2B5EF4-FFF2-40B4-BE49-F238E27FC236}">
+                <a16:creationId xmlns:a16="http://schemas.microsoft.com/office/drawing/2014/main" id="{1CD63212-774C-6FC7-D4D1-C1A1614D7226}"/>
+              </a:ext>
+            </a:extLst>
+          </p:cNvPr>
+          <p:cNvSpPr>
+            <a:spLocks noGrp="1"/>
+          </p:cNvSpPr>
+          <p:nvPr>
+            <p:ph type="ftr" sz="quarter" idx="11"/>
+          </p:nvPr>
+        </p:nvSpPr>
+        <p:spPr>
+          <a:xfrm>
+            <a:off x="2259013" y="6248398"/>
+            <a:ext cx="7084177" cy="365125"/>
+          </a:xfrm>
+        </p:spPr>
+        <p:txBody>
+          <a:bodyPr/>
+          <a:lstStyle/>
+          <a:p>
+            <a:r>
+              <a:rPr lang="en-US" b="1" dirty="0"/>
+              <a:t>Presenter: Manoj Kumar Gude</a:t>
+            </a:r>
+            <a:endParaRPr lang="en-US" dirty="0"/>
+          </a:p>
+        </p:txBody>
+      </p:sp>
+      <p:sp>
+        <p:nvSpPr>
+          <p:cNvPr id="5" name="Slide Number Placeholder 4">
+            <a:extLst>
+              <a:ext uri="{FF2B5EF4-FFF2-40B4-BE49-F238E27FC236}">
+                <a16:creationId xmlns:a16="http://schemas.microsoft.com/office/drawing/2014/main" id="{C5A23534-DEED-6C84-721E-1871EB173A97}"/>
+              </a:ext>
+            </a:extLst>
+          </p:cNvPr>
+          <p:cNvSpPr>
+            <a:spLocks noGrp="1"/>
+          </p:cNvSpPr>
+          <p:nvPr>
+            <p:ph type="sldNum" sz="quarter" idx="12"/>
+          </p:nvPr>
+        </p:nvSpPr>
+        <p:spPr/>
+        <p:txBody>
+          <a:bodyPr/>
+          <a:lstStyle/>
+          <a:p>
+            <a:fld id="{EE0D7808-EC4E-46D2-ABA0-EA3F9AF1A2E3}" type="slidenum">
+              <a:rPr lang="en-US" smtClean="0"/>
+              <a:t>9</a:t>
+            </a:fld>
+            <a:endParaRPr lang="en-US" dirty="0"/>
+          </a:p>
+        </p:txBody>
+      </p:sp>
+    </p:spTree>
+    <p:extLst>
+      <p:ext uri="{BB962C8B-B14F-4D97-AF65-F5344CB8AC3E}">
+        <p14:creationId xmlns:p14="http://schemas.microsoft.com/office/powerpoint/2010/main" val="3074008843"/>
       </p:ext>
     </p:extLst>
   </p:cSld>

</xml_diff>

<commit_message>
Updated workshop slides on Intents
</commit_message>
<xml_diff>
--- a/Project_Files/Sprint10/FREEBIES FOR NEWBIES Workshop2 (1).pptx
+++ b/Project_Files/Sprint10/FREEBIES FOR NEWBIES Workshop2 (1).pptx
@@ -5,7 +5,7 @@
     <p:sldMasterId id="2147483660" r:id="rId1"/>
   </p:sldMasterIdLst>
   <p:notesMasterIdLst>
-    <p:notesMasterId r:id="rId12"/>
+    <p:notesMasterId r:id="rId16"/>
   </p:notesMasterIdLst>
   <p:sldIdLst>
     <p:sldId id="256" r:id="rId2"/>
@@ -18,6 +18,10 @@
     <p:sldId id="274" r:id="rId9"/>
     <p:sldId id="275" r:id="rId10"/>
     <p:sldId id="276" r:id="rId11"/>
+    <p:sldId id="259" r:id="rId12"/>
+    <p:sldId id="260" r:id="rId13"/>
+    <p:sldId id="261" r:id="rId14"/>
+    <p:sldId id="262" r:id="rId15"/>
   </p:sldIdLst>
   <p:sldSz cx="12192000" cy="6858000"/>
   <p:notesSz cx="6858000" cy="9144000"/>
@@ -134,58 +138,6 @@
 
 <file path=ppt/changesInfos/changesInfo1.xml><?xml version="1.0" encoding="utf-8"?>
 <pc:chgInfo xmlns:a="http://schemas.openxmlformats.org/drawingml/2006/main" xmlns:r="http://schemas.openxmlformats.org/officeDocument/2006/relationships" xmlns:ac="http://schemas.microsoft.com/office/drawing/2013/main/command" xmlns:pc="http://schemas.microsoft.com/office/powerpoint/2013/main/command">
-  <pc:docChgLst>
-    <pc:chgData name="Gude,Manoj Kumar" userId="0e353df1-568e-4a01-a0b1-bd99741cd871" providerId="ADAL" clId="{4EA16B51-BD4D-438E-8610-2F766D738BEC}"/>
-    <pc:docChg chg="addSld modSld">
-      <pc:chgData name="Gude,Manoj Kumar" userId="0e353df1-568e-4a01-a0b1-bd99741cd871" providerId="ADAL" clId="{4EA16B51-BD4D-438E-8610-2F766D738BEC}" dt="2022-11-04T20:53:53.471" v="5"/>
-      <pc:docMkLst>
-        <pc:docMk/>
-      </pc:docMkLst>
-      <pc:sldChg chg="add">
-        <pc:chgData name="Gude,Manoj Kumar" userId="0e353df1-568e-4a01-a0b1-bd99741cd871" providerId="ADAL" clId="{4EA16B51-BD4D-438E-8610-2F766D738BEC}" dt="2022-11-04T20:53:25.760" v="2"/>
-        <pc:sldMkLst>
-          <pc:docMk/>
-          <pc:sldMk cId="1636084600" sldId="273"/>
-        </pc:sldMkLst>
-      </pc:sldChg>
-      <pc:sldChg chg="add">
-        <pc:chgData name="Gude,Manoj Kumar" userId="0e353df1-568e-4a01-a0b1-bd99741cd871" providerId="ADAL" clId="{4EA16B51-BD4D-438E-8610-2F766D738BEC}" dt="2022-11-04T20:53:35.688" v="3"/>
-        <pc:sldMkLst>
-          <pc:docMk/>
-          <pc:sldMk cId="257207380" sldId="274"/>
-        </pc:sldMkLst>
-      </pc:sldChg>
-      <pc:sldChg chg="add">
-        <pc:chgData name="Gude,Manoj Kumar" userId="0e353df1-568e-4a01-a0b1-bd99741cd871" providerId="ADAL" clId="{4EA16B51-BD4D-438E-8610-2F766D738BEC}" dt="2022-11-04T20:53:43.516" v="4"/>
-        <pc:sldMkLst>
-          <pc:docMk/>
-          <pc:sldMk cId="3074008843" sldId="275"/>
-        </pc:sldMkLst>
-      </pc:sldChg>
-      <pc:sldChg chg="add">
-        <pc:chgData name="Gude,Manoj Kumar" userId="0e353df1-568e-4a01-a0b1-bd99741cd871" providerId="ADAL" clId="{4EA16B51-BD4D-438E-8610-2F766D738BEC}" dt="2022-11-04T20:53:53.471" v="5"/>
-        <pc:sldMkLst>
-          <pc:docMk/>
-          <pc:sldMk cId="1554882151" sldId="276"/>
-        </pc:sldMkLst>
-      </pc:sldChg>
-      <pc:sldChg chg="addSp delSp modSp">
-        <pc:chgData name="Gude,Manoj Kumar" userId="0e353df1-568e-4a01-a0b1-bd99741cd871" providerId="ADAL" clId="{4EA16B51-BD4D-438E-8610-2F766D738BEC}" dt="2022-11-04T20:53:15.725" v="1"/>
-        <pc:sldMkLst>
-          <pc:docMk/>
-          <pc:sldMk cId="3997424871" sldId="282"/>
-        </pc:sldMkLst>
-        <pc:graphicFrameChg chg="add del mod">
-          <ac:chgData name="Gude,Manoj Kumar" userId="0e353df1-568e-4a01-a0b1-bd99741cd871" providerId="ADAL" clId="{4EA16B51-BD4D-438E-8610-2F766D738BEC}" dt="2022-11-04T20:53:15.725" v="1"/>
-          <ac:graphicFrameMkLst>
-            <pc:docMk/>
-            <pc:sldMk cId="3997424871" sldId="282"/>
-            <ac:graphicFrameMk id="6" creationId="{04968455-9BC9-42BE-EF51-CD4110AE420E}"/>
-          </ac:graphicFrameMkLst>
-        </pc:graphicFrameChg>
-      </pc:sldChg>
-    </pc:docChg>
-  </pc:docChgLst>
   <pc:docChgLst>
     <pc:chgData name="Mulakalapalli,Jaichand" userId="a3680caf-10e5-4540-ae62-1e7229e4db6c" providerId="ADAL" clId="{A761AB05-66D5-4B97-8E12-7FFDAB65DEFF}"/>
     <pc:docChg chg="undo redo custSel addSld delSld modSld">
@@ -1411,6 +1363,58 @@
           <pc:docMk/>
           <pc:sldMk cId="61278759" sldId="284"/>
         </pc:sldMkLst>
+      </pc:sldChg>
+    </pc:docChg>
+  </pc:docChgLst>
+  <pc:docChgLst>
+    <pc:chgData name="Gude,Manoj Kumar" userId="0e353df1-568e-4a01-a0b1-bd99741cd871" providerId="ADAL" clId="{4EA16B51-BD4D-438E-8610-2F766D738BEC}"/>
+    <pc:docChg chg="addSld modSld">
+      <pc:chgData name="Gude,Manoj Kumar" userId="0e353df1-568e-4a01-a0b1-bd99741cd871" providerId="ADAL" clId="{4EA16B51-BD4D-438E-8610-2F766D738BEC}" dt="2022-11-04T20:53:53.471" v="5"/>
+      <pc:docMkLst>
+        <pc:docMk/>
+      </pc:docMkLst>
+      <pc:sldChg chg="add">
+        <pc:chgData name="Gude,Manoj Kumar" userId="0e353df1-568e-4a01-a0b1-bd99741cd871" providerId="ADAL" clId="{4EA16B51-BD4D-438E-8610-2F766D738BEC}" dt="2022-11-04T20:53:25.760" v="2"/>
+        <pc:sldMkLst>
+          <pc:docMk/>
+          <pc:sldMk cId="1636084600" sldId="273"/>
+        </pc:sldMkLst>
+      </pc:sldChg>
+      <pc:sldChg chg="add">
+        <pc:chgData name="Gude,Manoj Kumar" userId="0e353df1-568e-4a01-a0b1-bd99741cd871" providerId="ADAL" clId="{4EA16B51-BD4D-438E-8610-2F766D738BEC}" dt="2022-11-04T20:53:35.688" v="3"/>
+        <pc:sldMkLst>
+          <pc:docMk/>
+          <pc:sldMk cId="257207380" sldId="274"/>
+        </pc:sldMkLst>
+      </pc:sldChg>
+      <pc:sldChg chg="add">
+        <pc:chgData name="Gude,Manoj Kumar" userId="0e353df1-568e-4a01-a0b1-bd99741cd871" providerId="ADAL" clId="{4EA16B51-BD4D-438E-8610-2F766D738BEC}" dt="2022-11-04T20:53:43.516" v="4"/>
+        <pc:sldMkLst>
+          <pc:docMk/>
+          <pc:sldMk cId="3074008843" sldId="275"/>
+        </pc:sldMkLst>
+      </pc:sldChg>
+      <pc:sldChg chg="add">
+        <pc:chgData name="Gude,Manoj Kumar" userId="0e353df1-568e-4a01-a0b1-bd99741cd871" providerId="ADAL" clId="{4EA16B51-BD4D-438E-8610-2F766D738BEC}" dt="2022-11-04T20:53:53.471" v="5"/>
+        <pc:sldMkLst>
+          <pc:docMk/>
+          <pc:sldMk cId="1554882151" sldId="276"/>
+        </pc:sldMkLst>
+      </pc:sldChg>
+      <pc:sldChg chg="addSp delSp modSp">
+        <pc:chgData name="Gude,Manoj Kumar" userId="0e353df1-568e-4a01-a0b1-bd99741cd871" providerId="ADAL" clId="{4EA16B51-BD4D-438E-8610-2F766D738BEC}" dt="2022-11-04T20:53:15.725" v="1"/>
+        <pc:sldMkLst>
+          <pc:docMk/>
+          <pc:sldMk cId="3997424871" sldId="282"/>
+        </pc:sldMkLst>
+        <pc:graphicFrameChg chg="add del mod">
+          <ac:chgData name="Gude,Manoj Kumar" userId="0e353df1-568e-4a01-a0b1-bd99741cd871" providerId="ADAL" clId="{4EA16B51-BD4D-438E-8610-2F766D738BEC}" dt="2022-11-04T20:53:15.725" v="1"/>
+          <ac:graphicFrameMkLst>
+            <pc:docMk/>
+            <pc:sldMk cId="3997424871" sldId="282"/>
+            <ac:graphicFrameMk id="6" creationId="{04968455-9BC9-42BE-EF51-CD4110AE420E}"/>
+          </ac:graphicFrameMkLst>
+        </pc:graphicFrameChg>
       </pc:sldChg>
     </pc:docChg>
   </pc:docChgLst>
@@ -18314,6 +18318,1409 @@
 </p:sld>
 </file>
 
+<file path=ppt/slides/slide11.xml><?xml version="1.0" encoding="utf-8"?>
+<p:sld xmlns:a="http://schemas.openxmlformats.org/drawingml/2006/main" xmlns:r="http://schemas.openxmlformats.org/officeDocument/2006/relationships" xmlns:p="http://schemas.openxmlformats.org/presentationml/2006/main">
+  <p:cSld>
+    <p:spTree>
+      <p:nvGrpSpPr>
+        <p:cNvPr id="1" name=""/>
+        <p:cNvGrpSpPr/>
+        <p:nvPr/>
+      </p:nvGrpSpPr>
+      <p:grpSpPr>
+        <a:xfrm>
+          <a:off x="0" y="0"/>
+          <a:ext cx="0" cy="0"/>
+          <a:chOff x="0" y="0"/>
+          <a:chExt cx="0" cy="0"/>
+        </a:xfrm>
+      </p:grpSpPr>
+      <p:sp>
+        <p:nvSpPr>
+          <p:cNvPr id="2" name="Title 1">
+            <a:extLst>
+              <a:ext uri="{FF2B5EF4-FFF2-40B4-BE49-F238E27FC236}">
+                <a16:creationId xmlns:a16="http://schemas.microsoft.com/office/drawing/2014/main" id="{B0E1CDB1-5FCA-C960-951F-89A45E48B1AE}"/>
+              </a:ext>
+            </a:extLst>
+          </p:cNvPr>
+          <p:cNvSpPr>
+            <a:spLocks noGrp="1"/>
+          </p:cNvSpPr>
+          <p:nvPr>
+            <p:ph type="title"/>
+          </p:nvPr>
+        </p:nvSpPr>
+        <p:spPr/>
+        <p:txBody>
+          <a:bodyPr/>
+          <a:lstStyle/>
+          <a:p>
+            <a:r>
+              <a:rPr lang="en-US" dirty="0"/>
+              <a:t>Intents</a:t>
+            </a:r>
+          </a:p>
+        </p:txBody>
+      </p:sp>
+      <p:sp>
+        <p:nvSpPr>
+          <p:cNvPr id="4" name="Footer Placeholder 3">
+            <a:extLst>
+              <a:ext uri="{FF2B5EF4-FFF2-40B4-BE49-F238E27FC236}">
+                <a16:creationId xmlns:a16="http://schemas.microsoft.com/office/drawing/2014/main" id="{A0C6F084-91BD-F1F8-16CE-BEB88CA2371B}"/>
+              </a:ext>
+            </a:extLst>
+          </p:cNvPr>
+          <p:cNvSpPr>
+            <a:spLocks noGrp="1"/>
+          </p:cNvSpPr>
+          <p:nvPr>
+            <p:ph type="ftr" sz="quarter" idx="11"/>
+          </p:nvPr>
+        </p:nvSpPr>
+        <p:spPr/>
+        <p:txBody>
+          <a:bodyPr/>
+          <a:lstStyle/>
+          <a:p>
+            <a:r>
+              <a:rPr lang="en-US" b="1" dirty="0"/>
+              <a:t>Presenter</a:t>
+            </a:r>
+            <a:r>
+              <a:rPr lang="en-US" dirty="0"/>
+              <a:t>: </a:t>
+            </a:r>
+            <a:r>
+              <a:rPr lang="en-US" b="1" dirty="0"/>
+              <a:t>Saibabu Devarapalli</a:t>
+            </a:r>
+            <a:endParaRPr lang="en-US" dirty="0"/>
+          </a:p>
+        </p:txBody>
+      </p:sp>
+      <p:sp>
+        <p:nvSpPr>
+          <p:cNvPr id="5" name="Slide Number Placeholder 4">
+            <a:extLst>
+              <a:ext uri="{FF2B5EF4-FFF2-40B4-BE49-F238E27FC236}">
+                <a16:creationId xmlns:a16="http://schemas.microsoft.com/office/drawing/2014/main" id="{866B9632-8C05-0A9C-6E98-1751CF959D42}"/>
+              </a:ext>
+            </a:extLst>
+          </p:cNvPr>
+          <p:cNvSpPr>
+            <a:spLocks noGrp="1"/>
+          </p:cNvSpPr>
+          <p:nvPr>
+            <p:ph type="sldNum" sz="quarter" idx="12"/>
+          </p:nvPr>
+        </p:nvSpPr>
+        <p:spPr/>
+        <p:txBody>
+          <a:bodyPr/>
+          <a:lstStyle/>
+          <a:p>
+            <a:fld id="{EE0D7808-EC4E-46D2-ABA0-EA3F9AF1A2E3}" type="slidenum">
+              <a:rPr lang="en-US" smtClean="0"/>
+              <a:t>11</a:t>
+            </a:fld>
+            <a:endParaRPr lang="en-US" dirty="0"/>
+          </a:p>
+        </p:txBody>
+      </p:sp>
+      <p:sp>
+        <p:nvSpPr>
+          <p:cNvPr id="6" name="Content Placeholder 2">
+            <a:extLst>
+              <a:ext uri="{FF2B5EF4-FFF2-40B4-BE49-F238E27FC236}">
+                <a16:creationId xmlns:a16="http://schemas.microsoft.com/office/drawing/2014/main" id="{150AE252-143F-7D10-6156-1308922BEC76}"/>
+              </a:ext>
+            </a:extLst>
+          </p:cNvPr>
+          <p:cNvSpPr>
+            <a:spLocks noGrp="1"/>
+          </p:cNvSpPr>
+          <p:nvPr>
+            <p:ph idx="1"/>
+          </p:nvPr>
+        </p:nvSpPr>
+        <p:spPr>
+          <a:xfrm>
+            <a:off x="1085850" y="2338386"/>
+            <a:ext cx="6238875" cy="3171825"/>
+          </a:xfrm>
+        </p:spPr>
+        <p:txBody>
+          <a:bodyPr>
+            <a:normAutofit/>
+          </a:bodyPr>
+          <a:lstStyle/>
+          <a:p>
+            <a:pPr lvl="1">
+              <a:spcBef>
+                <a:spcPts val="600"/>
+              </a:spcBef>
+            </a:pPr>
+            <a:r>
+              <a:rPr lang="en-US" dirty="0"/>
+              <a:t>An intent is a message, sent to an app component  (activity, service, broadcast receiver)</a:t>
+            </a:r>
+          </a:p>
+          <a:p>
+            <a:pPr lvl="1">
+              <a:spcBef>
+                <a:spcPts val="600"/>
+              </a:spcBef>
+            </a:pPr>
+            <a:r>
+              <a:rPr lang="en-US" dirty="0"/>
+              <a:t>Can be used to:</a:t>
+            </a:r>
+          </a:p>
+          <a:p>
+            <a:pPr lvl="2">
+              <a:spcBef>
+                <a:spcPts val="600"/>
+              </a:spcBef>
+            </a:pPr>
+            <a:r>
+              <a:rPr lang="en-US" dirty="0"/>
+              <a:t>start an activity</a:t>
+            </a:r>
+          </a:p>
+          <a:p>
+            <a:pPr lvl="2">
+              <a:spcBef>
+                <a:spcPts val="600"/>
+              </a:spcBef>
+            </a:pPr>
+            <a:r>
+              <a:rPr lang="en-US" dirty="0"/>
+              <a:t>start a service</a:t>
+            </a:r>
+          </a:p>
+          <a:p>
+            <a:pPr lvl="2">
+              <a:spcBef>
+                <a:spcPts val="600"/>
+              </a:spcBef>
+            </a:pPr>
+            <a:r>
+              <a:rPr lang="en-US" dirty="0"/>
+              <a:t>broadcast information to other apps</a:t>
+            </a:r>
+          </a:p>
+          <a:p>
+            <a:endParaRPr lang="en-US" dirty="0"/>
+          </a:p>
+        </p:txBody>
+      </p:sp>
+      <p:grpSp>
+        <p:nvGrpSpPr>
+          <p:cNvPr id="7" name="Group 6">
+            <a:extLst>
+              <a:ext uri="{FF2B5EF4-FFF2-40B4-BE49-F238E27FC236}">
+                <a16:creationId xmlns:a16="http://schemas.microsoft.com/office/drawing/2014/main" id="{7F010E02-27B0-B8E2-755D-53151DCCC351}"/>
+              </a:ext>
+            </a:extLst>
+          </p:cNvPr>
+          <p:cNvGrpSpPr/>
+          <p:nvPr/>
+        </p:nvGrpSpPr>
+        <p:grpSpPr>
+          <a:xfrm>
+            <a:off x="7324725" y="2585594"/>
+            <a:ext cx="4007817" cy="2638050"/>
+            <a:chOff x="6096000" y="2705101"/>
+            <a:chExt cx="4007817" cy="2638050"/>
+          </a:xfrm>
+        </p:grpSpPr>
+        <p:pic>
+          <p:nvPicPr>
+            <p:cNvPr id="8" name="Picture 7">
+              <a:extLst>
+                <a:ext uri="{FF2B5EF4-FFF2-40B4-BE49-F238E27FC236}">
+                  <a16:creationId xmlns:a16="http://schemas.microsoft.com/office/drawing/2014/main" id="{3F7FC355-FC0A-D0F5-12A1-43A1046E8AAF}"/>
+                </a:ext>
+              </a:extLst>
+            </p:cNvPr>
+            <p:cNvPicPr>
+              <a:picLocks noChangeAspect="1"/>
+            </p:cNvPicPr>
+            <p:nvPr/>
+          </p:nvPicPr>
+          <p:blipFill>
+            <a:blip r:embed="rId2"/>
+            <a:stretch>
+              <a:fillRect/>
+            </a:stretch>
+          </p:blipFill>
+          <p:spPr>
+            <a:xfrm>
+              <a:off x="6096000" y="2705101"/>
+              <a:ext cx="4007817" cy="2268718"/>
+            </a:xfrm>
+            <a:prstGeom prst="rect">
+              <a:avLst/>
+            </a:prstGeom>
+          </p:spPr>
+        </p:pic>
+        <p:sp>
+          <p:nvSpPr>
+            <p:cNvPr id="9" name="TextBox 8">
+              <a:extLst>
+                <a:ext uri="{FF2B5EF4-FFF2-40B4-BE49-F238E27FC236}">
+                  <a16:creationId xmlns:a16="http://schemas.microsoft.com/office/drawing/2014/main" id="{8424B50C-94C3-5EC2-E1A8-A404F4112F67}"/>
+                </a:ext>
+              </a:extLst>
+            </p:cNvPr>
+            <p:cNvSpPr txBox="1"/>
+            <p:nvPr/>
+          </p:nvSpPr>
+          <p:spPr>
+            <a:xfrm>
+              <a:off x="7070910" y="4973819"/>
+              <a:ext cx="2087110" cy="369332"/>
+            </a:xfrm>
+            <a:prstGeom prst="rect">
+              <a:avLst/>
+            </a:prstGeom>
+            <a:noFill/>
+          </p:spPr>
+          <p:txBody>
+            <a:bodyPr wrap="none" rtlCol="0">
+              <a:spAutoFit/>
+            </a:bodyPr>
+            <a:lstStyle/>
+            <a:p>
+              <a:r>
+                <a:rPr lang="en-US" b="1" dirty="0"/>
+                <a:t>Fig 6: </a:t>
+              </a:r>
+              <a:r>
+                <a:rPr lang="en-US" dirty="0"/>
+                <a:t>Intents Usage</a:t>
+              </a:r>
+            </a:p>
+          </p:txBody>
+        </p:sp>
+      </p:grpSp>
+    </p:spTree>
+    <p:extLst>
+      <p:ext uri="{BB962C8B-B14F-4D97-AF65-F5344CB8AC3E}">
+        <p14:creationId xmlns:p14="http://schemas.microsoft.com/office/powerpoint/2010/main" val="39358982"/>
+      </p:ext>
+    </p:extLst>
+  </p:cSld>
+  <p:clrMapOvr>
+    <a:masterClrMapping/>
+  </p:clrMapOvr>
+</p:sld>
+</file>
+
+<file path=ppt/slides/slide12.xml><?xml version="1.0" encoding="utf-8"?>
+<p:sld xmlns:a="http://schemas.openxmlformats.org/drawingml/2006/main" xmlns:r="http://schemas.openxmlformats.org/officeDocument/2006/relationships" xmlns:p="http://schemas.openxmlformats.org/presentationml/2006/main">
+  <p:cSld>
+    <p:spTree>
+      <p:nvGrpSpPr>
+        <p:cNvPr id="1" name=""/>
+        <p:cNvGrpSpPr/>
+        <p:nvPr/>
+      </p:nvGrpSpPr>
+      <p:grpSpPr>
+        <a:xfrm>
+          <a:off x="0" y="0"/>
+          <a:ext cx="0" cy="0"/>
+          <a:chOff x="0" y="0"/>
+          <a:chExt cx="0" cy="0"/>
+        </a:xfrm>
+      </p:grpSpPr>
+      <p:sp>
+        <p:nvSpPr>
+          <p:cNvPr id="2" name="Title 1">
+            <a:extLst>
+              <a:ext uri="{FF2B5EF4-FFF2-40B4-BE49-F238E27FC236}">
+                <a16:creationId xmlns:a16="http://schemas.microsoft.com/office/drawing/2014/main" id="{80E30BA2-E658-753A-DF71-2446376793BA}"/>
+              </a:ext>
+            </a:extLst>
+          </p:cNvPr>
+          <p:cNvSpPr>
+            <a:spLocks noGrp="1"/>
+          </p:cNvSpPr>
+          <p:nvPr>
+            <p:ph type="title"/>
+          </p:nvPr>
+        </p:nvSpPr>
+        <p:spPr/>
+        <p:txBody>
+          <a:bodyPr/>
+          <a:lstStyle/>
+          <a:p>
+            <a:r>
+              <a:rPr lang="en-US" dirty="0"/>
+              <a:t>Intents: Types</a:t>
+            </a:r>
+          </a:p>
+        </p:txBody>
+      </p:sp>
+      <p:sp>
+        <p:nvSpPr>
+          <p:cNvPr id="3" name="Content Placeholder 2">
+            <a:extLst>
+              <a:ext uri="{FF2B5EF4-FFF2-40B4-BE49-F238E27FC236}">
+                <a16:creationId xmlns:a16="http://schemas.microsoft.com/office/drawing/2014/main" id="{FFCD49C2-A839-B1D9-5AF4-74B1C23DDF1C}"/>
+              </a:ext>
+            </a:extLst>
+          </p:cNvPr>
+          <p:cNvSpPr>
+            <a:spLocks noGrp="1"/>
+          </p:cNvSpPr>
+          <p:nvPr>
+            <p:ph idx="1"/>
+          </p:nvPr>
+        </p:nvSpPr>
+        <p:spPr>
+          <a:xfrm>
+            <a:off x="1484310" y="1600200"/>
+            <a:ext cx="10018713" cy="4448175"/>
+          </a:xfrm>
+        </p:spPr>
+        <p:txBody>
+          <a:bodyPr>
+            <a:normAutofit/>
+          </a:bodyPr>
+          <a:lstStyle/>
+          <a:p>
+            <a:r>
+              <a:rPr lang="en-US" b="1" dirty="0"/>
+              <a:t>Explicit</a:t>
+            </a:r>
+            <a:r>
+              <a:rPr lang="en-US" dirty="0"/>
+              <a:t> Intents specify the component to start explicitly, by name. This is usually used to start a component in your own app.</a:t>
+            </a:r>
+          </a:p>
+          <a:p>
+            <a:pPr marL="0" indent="0">
+              <a:spcBef>
+                <a:spcPts val="0"/>
+              </a:spcBef>
+              <a:spcAft>
+                <a:spcPts val="0"/>
+              </a:spcAft>
+              <a:buNone/>
+            </a:pPr>
+            <a:r>
+              <a:rPr lang="en-US" sz="2400" b="1" dirty="0"/>
+              <a:t>		</a:t>
+            </a:r>
+            <a:r>
+              <a:rPr lang="en-US" sz="1800" b="1" dirty="0"/>
+              <a:t>Example:</a:t>
+            </a:r>
+            <a:r>
+              <a:rPr lang="en-US" sz="1800" dirty="0">
+                <a:cs typeface="Times New Roman" panose="02020603050405020304" pitchFamily="18" charset="0"/>
+              </a:rPr>
+              <a:t>Intent downloadIntent = new Intent(this, DownloadService.class);</a:t>
+            </a:r>
+          </a:p>
+          <a:p>
+            <a:pPr marL="0" indent="0">
+              <a:spcBef>
+                <a:spcPts val="0"/>
+              </a:spcBef>
+              <a:spcAft>
+                <a:spcPts val="0"/>
+              </a:spcAft>
+              <a:buNone/>
+            </a:pPr>
+            <a:r>
+              <a:rPr lang="en-US" sz="1800" dirty="0">
+                <a:cs typeface="Times New Roman" panose="02020603050405020304" pitchFamily="18" charset="0"/>
+              </a:rPr>
+              <a:t>				downloadIntent.setData(Uri.parse(fileUrl));</a:t>
+            </a:r>
+          </a:p>
+          <a:p>
+            <a:pPr marL="0" indent="0">
+              <a:spcBef>
+                <a:spcPts val="0"/>
+              </a:spcBef>
+              <a:spcAft>
+                <a:spcPts val="0"/>
+              </a:spcAft>
+              <a:buNone/>
+            </a:pPr>
+            <a:r>
+              <a:rPr lang="en-US" sz="1800" dirty="0">
+                <a:cs typeface="Times New Roman" panose="02020603050405020304" pitchFamily="18" charset="0"/>
+              </a:rPr>
+              <a:t>				startService(downloadIntent);</a:t>
+            </a:r>
+          </a:p>
+          <a:p>
+            <a:pPr marL="0" indent="0">
+              <a:spcBef>
+                <a:spcPts val="0"/>
+              </a:spcBef>
+              <a:spcAft>
+                <a:spcPts val="0"/>
+              </a:spcAft>
+              <a:buNone/>
+            </a:pPr>
+            <a:endParaRPr lang="en-US" sz="1800" dirty="0">
+              <a:cs typeface="Times New Roman" panose="02020603050405020304" pitchFamily="18" charset="0"/>
+            </a:endParaRPr>
+          </a:p>
+          <a:p>
+            <a:r>
+              <a:rPr lang="en-US" b="1" dirty="0"/>
+              <a:t>Implicit</a:t>
+            </a:r>
+            <a:r>
+              <a:rPr lang="en-US" dirty="0"/>
+              <a:t> Intents do not specify a component by name; rather they specify an action that needs to be performed. Android then delivers that intent to an app capable of performing that action.</a:t>
+            </a:r>
+          </a:p>
+          <a:p>
+            <a:pPr marL="0" marR="0" lvl="0" indent="0" algn="l" defTabSz="457200" rtl="0" eaLnBrk="1" fontAlgn="auto" latinLnBrk="0" hangingPunct="1">
+              <a:lnSpc>
+                <a:spcPct val="100000"/>
+              </a:lnSpc>
+              <a:spcBef>
+                <a:spcPts val="0"/>
+              </a:spcBef>
+              <a:spcAft>
+                <a:spcPts val="0"/>
+              </a:spcAft>
+              <a:buClr>
+                <a:srgbClr val="30ACEC">
+                  <a:lumMod val="75000"/>
+                </a:srgbClr>
+              </a:buClr>
+              <a:buSzPct val="145000"/>
+              <a:buFont typeface="Arial"/>
+              <a:buNone/>
+              <a:tabLst/>
+              <a:defRPr/>
+            </a:pPr>
+            <a:r>
+              <a:rPr kumimoji="0" lang="en-US" sz="1800" b="1" i="0" u="none" strike="noStrike" kern="1200" cap="none" spc="0" normalizeH="0" baseline="0" noProof="0" dirty="0">
+                <a:ln>
+                  <a:noFill/>
+                </a:ln>
+                <a:solidFill>
+                  <a:prstClr val="black"/>
+                </a:solidFill>
+                <a:effectLst/>
+                <a:uLnTx/>
+                <a:uFillTx/>
+                <a:latin typeface="Corbel" panose="020B0503020204020204"/>
+                <a:ea typeface="+mn-ea"/>
+                <a:cs typeface="+mn-cs"/>
+              </a:rPr>
+              <a:t>		Example:</a:t>
+            </a:r>
+            <a:r>
+              <a:rPr kumimoji="0" lang="en-US" sz="1800" b="0" i="0" u="none" strike="noStrike" kern="1200" cap="none" spc="0" normalizeH="0" baseline="0" noProof="0" dirty="0">
+                <a:ln>
+                  <a:noFill/>
+                </a:ln>
+                <a:solidFill>
+                  <a:prstClr val="black"/>
+                </a:solidFill>
+                <a:effectLst/>
+                <a:uLnTx/>
+                <a:uFillTx/>
+                <a:latin typeface="Corbel" panose="020B0503020204020204"/>
+                <a:ea typeface="+mn-ea"/>
+                <a:cs typeface="Times New Roman" panose="02020603050405020304" pitchFamily="18" charset="0"/>
+              </a:rPr>
+              <a:t>Intent sendIntent = newIntent();</a:t>
+            </a:r>
+          </a:p>
+          <a:p>
+            <a:pPr marL="0" marR="0" lvl="0" indent="0" algn="l" defTabSz="457200" rtl="0" eaLnBrk="1" fontAlgn="auto" latinLnBrk="0" hangingPunct="1">
+              <a:lnSpc>
+                <a:spcPct val="100000"/>
+              </a:lnSpc>
+              <a:spcBef>
+                <a:spcPts val="0"/>
+              </a:spcBef>
+              <a:spcAft>
+                <a:spcPts val="0"/>
+              </a:spcAft>
+              <a:buClr>
+                <a:srgbClr val="30ACEC">
+                  <a:lumMod val="75000"/>
+                </a:srgbClr>
+              </a:buClr>
+              <a:buSzPct val="145000"/>
+              <a:buFont typeface="Arial"/>
+              <a:buNone/>
+              <a:tabLst/>
+              <a:defRPr/>
+            </a:pPr>
+            <a:r>
+              <a:rPr kumimoji="0" lang="en-US" sz="1800" b="0" i="0" u="none" strike="noStrike" kern="1200" cap="none" spc="0" normalizeH="0" baseline="0" noProof="0" dirty="0">
+                <a:ln>
+                  <a:noFill/>
+                </a:ln>
+                <a:solidFill>
+                  <a:prstClr val="black"/>
+                </a:solidFill>
+                <a:effectLst/>
+                <a:uLnTx/>
+                <a:uFillTx/>
+                <a:latin typeface="Corbel" panose="020B0503020204020204"/>
+                <a:ea typeface="+mn-ea"/>
+                <a:cs typeface="Times New Roman" panose="02020603050405020304" pitchFamily="18" charset="0"/>
+              </a:rPr>
+              <a:t>				sendIntent.setAction(Intent.ACTION_SEND);</a:t>
+            </a:r>
+          </a:p>
+          <a:p>
+            <a:pPr marL="0" marR="0" lvl="0" indent="0" algn="l" defTabSz="457200" rtl="0" eaLnBrk="1" fontAlgn="auto" latinLnBrk="0" hangingPunct="1">
+              <a:lnSpc>
+                <a:spcPct val="100000"/>
+              </a:lnSpc>
+              <a:spcBef>
+                <a:spcPts val="0"/>
+              </a:spcBef>
+              <a:spcAft>
+                <a:spcPts val="0"/>
+              </a:spcAft>
+              <a:buClr>
+                <a:srgbClr val="30ACEC">
+                  <a:lumMod val="75000"/>
+                </a:srgbClr>
+              </a:buClr>
+              <a:buSzPct val="145000"/>
+              <a:buFont typeface="Arial"/>
+              <a:buNone/>
+              <a:tabLst/>
+              <a:defRPr/>
+            </a:pPr>
+            <a:r>
+              <a:rPr kumimoji="0" lang="en-US" sz="1800" b="0" i="0" u="none" strike="noStrike" kern="1200" cap="none" spc="0" normalizeH="0" baseline="0" noProof="0" dirty="0">
+                <a:ln>
+                  <a:noFill/>
+                </a:ln>
+                <a:solidFill>
+                  <a:prstClr val="black"/>
+                </a:solidFill>
+                <a:effectLst/>
+                <a:uLnTx/>
+                <a:uFillTx/>
+                <a:latin typeface="Corbel" panose="020B0503020204020204"/>
+                <a:ea typeface="+mn-ea"/>
+                <a:cs typeface="Times New Roman" panose="02020603050405020304" pitchFamily="18" charset="0"/>
+              </a:rPr>
+              <a:t>				sendIntent.putExtra(Intent.EXTRA_TEXT, textMessage);</a:t>
+            </a:r>
+          </a:p>
+          <a:p>
+            <a:pPr marL="0" marR="0" lvl="0" indent="0" algn="l" defTabSz="457200" rtl="0" eaLnBrk="1" fontAlgn="auto" latinLnBrk="0" hangingPunct="1">
+              <a:lnSpc>
+                <a:spcPct val="100000"/>
+              </a:lnSpc>
+              <a:spcBef>
+                <a:spcPts val="0"/>
+              </a:spcBef>
+              <a:spcAft>
+                <a:spcPts val="0"/>
+              </a:spcAft>
+              <a:buClr>
+                <a:srgbClr val="30ACEC">
+                  <a:lumMod val="75000"/>
+                </a:srgbClr>
+              </a:buClr>
+              <a:buSzPct val="145000"/>
+              <a:buFont typeface="Arial"/>
+              <a:buNone/>
+              <a:tabLst/>
+              <a:defRPr/>
+            </a:pPr>
+            <a:r>
+              <a:rPr kumimoji="0" lang="en-US" sz="1800" b="0" i="0" u="none" strike="noStrike" kern="1200" cap="none" spc="0" normalizeH="0" baseline="0" noProof="0" dirty="0">
+                <a:ln>
+                  <a:noFill/>
+                </a:ln>
+                <a:solidFill>
+                  <a:prstClr val="black"/>
+                </a:solidFill>
+                <a:effectLst/>
+                <a:uLnTx/>
+                <a:uFillTx/>
+                <a:latin typeface="Corbel" panose="020B0503020204020204"/>
+                <a:ea typeface="+mn-ea"/>
+                <a:cs typeface="Times New Roman" panose="02020603050405020304" pitchFamily="18" charset="0"/>
+              </a:rPr>
+              <a:t>				startActivity(sendIntent);</a:t>
+            </a:r>
+            <a:endParaRPr lang="en-US" dirty="0"/>
+          </a:p>
+        </p:txBody>
+      </p:sp>
+      <p:sp>
+        <p:nvSpPr>
+          <p:cNvPr id="4" name="Footer Placeholder 3">
+            <a:extLst>
+              <a:ext uri="{FF2B5EF4-FFF2-40B4-BE49-F238E27FC236}">
+                <a16:creationId xmlns:a16="http://schemas.microsoft.com/office/drawing/2014/main" id="{262B6B1D-8D02-5480-AC54-EEE3DE3AEC39}"/>
+              </a:ext>
+            </a:extLst>
+          </p:cNvPr>
+          <p:cNvSpPr>
+            <a:spLocks noGrp="1"/>
+          </p:cNvSpPr>
+          <p:nvPr>
+            <p:ph type="ftr" sz="quarter" idx="11"/>
+          </p:nvPr>
+        </p:nvSpPr>
+        <p:spPr/>
+        <p:txBody>
+          <a:bodyPr/>
+          <a:lstStyle/>
+          <a:p>
+            <a:r>
+              <a:rPr lang="en-US" b="1" dirty="0"/>
+              <a:t>Presenter: Saibabu Devarapalli</a:t>
+            </a:r>
+            <a:endParaRPr lang="en-US" dirty="0"/>
+          </a:p>
+        </p:txBody>
+      </p:sp>
+      <p:sp>
+        <p:nvSpPr>
+          <p:cNvPr id="5" name="Slide Number Placeholder 4">
+            <a:extLst>
+              <a:ext uri="{FF2B5EF4-FFF2-40B4-BE49-F238E27FC236}">
+                <a16:creationId xmlns:a16="http://schemas.microsoft.com/office/drawing/2014/main" id="{C738BB1F-BC78-1AED-91E5-83BA0DC04ACB}"/>
+              </a:ext>
+            </a:extLst>
+          </p:cNvPr>
+          <p:cNvSpPr>
+            <a:spLocks noGrp="1"/>
+          </p:cNvSpPr>
+          <p:nvPr>
+            <p:ph type="sldNum" sz="quarter" idx="12"/>
+          </p:nvPr>
+        </p:nvSpPr>
+        <p:spPr/>
+        <p:txBody>
+          <a:bodyPr/>
+          <a:lstStyle/>
+          <a:p>
+            <a:fld id="{EE0D7808-EC4E-46D2-ABA0-EA3F9AF1A2E3}" type="slidenum">
+              <a:rPr lang="en-US" smtClean="0"/>
+              <a:t>12</a:t>
+            </a:fld>
+            <a:endParaRPr lang="en-US" dirty="0"/>
+          </a:p>
+        </p:txBody>
+      </p:sp>
+    </p:spTree>
+    <p:extLst>
+      <p:ext uri="{BB962C8B-B14F-4D97-AF65-F5344CB8AC3E}">
+        <p14:creationId xmlns:p14="http://schemas.microsoft.com/office/powerpoint/2010/main" val="486793486"/>
+      </p:ext>
+    </p:extLst>
+  </p:cSld>
+  <p:clrMapOvr>
+    <a:masterClrMapping/>
+  </p:clrMapOvr>
+</p:sld>
+</file>
+
+<file path=ppt/slides/slide13.xml><?xml version="1.0" encoding="utf-8"?>
+<p:sld xmlns:a="http://schemas.openxmlformats.org/drawingml/2006/main" xmlns:r="http://schemas.openxmlformats.org/officeDocument/2006/relationships" xmlns:p="http://schemas.openxmlformats.org/presentationml/2006/main">
+  <p:cSld>
+    <p:spTree>
+      <p:nvGrpSpPr>
+        <p:cNvPr id="1" name=""/>
+        <p:cNvGrpSpPr/>
+        <p:nvPr/>
+      </p:nvGrpSpPr>
+      <p:grpSpPr>
+        <a:xfrm>
+          <a:off x="0" y="0"/>
+          <a:ext cx="0" cy="0"/>
+          <a:chOff x="0" y="0"/>
+          <a:chExt cx="0" cy="0"/>
+        </a:xfrm>
+      </p:grpSpPr>
+      <p:sp>
+        <p:nvSpPr>
+          <p:cNvPr id="2" name="Title 1">
+            <a:extLst>
+              <a:ext uri="{FF2B5EF4-FFF2-40B4-BE49-F238E27FC236}">
+                <a16:creationId xmlns:a16="http://schemas.microsoft.com/office/drawing/2014/main" id="{6E03D576-C9CE-6631-0B11-EB56415BAB86}"/>
+              </a:ext>
+            </a:extLst>
+          </p:cNvPr>
+          <p:cNvSpPr>
+            <a:spLocks noGrp="1"/>
+          </p:cNvSpPr>
+          <p:nvPr>
+            <p:ph type="title"/>
+          </p:nvPr>
+        </p:nvSpPr>
+        <p:spPr/>
+        <p:txBody>
+          <a:bodyPr>
+            <a:normAutofit/>
+          </a:bodyPr>
+          <a:lstStyle/>
+          <a:p>
+            <a:r>
+              <a:rPr lang="en-US" dirty="0"/>
+              <a:t>Intents: Sending Intents</a:t>
+            </a:r>
+          </a:p>
+        </p:txBody>
+      </p:sp>
+      <p:sp>
+        <p:nvSpPr>
+          <p:cNvPr id="3" name="Content Placeholder 2">
+            <a:extLst>
+              <a:ext uri="{FF2B5EF4-FFF2-40B4-BE49-F238E27FC236}">
+                <a16:creationId xmlns:a16="http://schemas.microsoft.com/office/drawing/2014/main" id="{E642190C-A4F6-0E76-F318-64168A02239A}"/>
+              </a:ext>
+            </a:extLst>
+          </p:cNvPr>
+          <p:cNvSpPr>
+            <a:spLocks noGrp="1"/>
+          </p:cNvSpPr>
+          <p:nvPr>
+            <p:ph idx="1"/>
+          </p:nvPr>
+        </p:nvSpPr>
+        <p:spPr/>
+        <p:txBody>
+          <a:bodyPr/>
+          <a:lstStyle/>
+          <a:p>
+            <a:r>
+              <a:rPr lang="en-US" b="1" dirty="0"/>
+              <a:t>startActivity(Intent intent)</a:t>
+            </a:r>
+          </a:p>
+          <a:p>
+            <a:r>
+              <a:rPr lang="en-US" dirty="0"/>
+              <a:t>Intent can be either explicit or implicit:</a:t>
+            </a:r>
+          </a:p>
+          <a:p>
+            <a:pPr lvl="1"/>
+            <a:r>
+              <a:rPr lang="en-US" dirty="0"/>
+              <a:t>public Intent(Context start Activity, Class classname)</a:t>
+            </a:r>
+          </a:p>
+          <a:p>
+            <a:pPr lvl="1"/>
+            <a:r>
+              <a:rPr lang="en-US" dirty="0"/>
+              <a:t>public Intent(String action)</a:t>
+            </a:r>
+          </a:p>
+          <a:p>
+            <a:pPr marL="914400" lvl="2" indent="0">
+              <a:spcBef>
+                <a:spcPts val="0"/>
+              </a:spcBef>
+              <a:spcAft>
+                <a:spcPts val="0"/>
+              </a:spcAft>
+              <a:buNone/>
+            </a:pPr>
+            <a:r>
+              <a:rPr lang="en-US" sz="1600" b="1" dirty="0"/>
+              <a:t>Example:</a:t>
+            </a:r>
+            <a:r>
+              <a:rPr lang="en-US" sz="1600" dirty="0"/>
+              <a:t> </a:t>
+            </a:r>
+            <a:r>
+              <a:rPr lang="en-US" sz="1600" b="0" i="0" u="none" strike="noStrike" baseline="0" dirty="0">
+                <a:solidFill>
+                  <a:srgbClr val="006700"/>
+                </a:solidFill>
+              </a:rPr>
+              <a:t>// Create the text message with a string</a:t>
+            </a:r>
+          </a:p>
+          <a:p>
+            <a:pPr marL="914400" lvl="2" indent="0">
+              <a:spcBef>
+                <a:spcPts val="0"/>
+              </a:spcBef>
+              <a:spcAft>
+                <a:spcPts val="0"/>
+              </a:spcAft>
+              <a:buNone/>
+            </a:pPr>
+            <a:r>
+              <a:rPr lang="en-US" sz="1600" b="0" i="0" u="none" strike="noStrike" baseline="0" dirty="0">
+                <a:solidFill>
+                  <a:srgbClr val="671466"/>
+                </a:solidFill>
+              </a:rPr>
+              <a:t>Intent </a:t>
+            </a:r>
+            <a:r>
+              <a:rPr lang="en-US" sz="1600" b="0" i="0" u="none" strike="noStrike" baseline="0" dirty="0">
+                <a:solidFill>
+                  <a:srgbClr val="000000"/>
+                </a:solidFill>
+              </a:rPr>
+              <a:t>sendIntent </a:t>
+            </a:r>
+            <a:r>
+              <a:rPr lang="en-US" sz="1600" b="0" i="0" u="none" strike="noStrike" baseline="0" dirty="0">
+                <a:solidFill>
+                  <a:srgbClr val="666700"/>
+                </a:solidFill>
+              </a:rPr>
+              <a:t>= </a:t>
+            </a:r>
+            <a:r>
+              <a:rPr lang="en-US" sz="1600" b="0" i="0" u="none" strike="noStrike" baseline="0" dirty="0">
+                <a:solidFill>
+                  <a:srgbClr val="011689"/>
+                </a:solidFill>
+              </a:rPr>
+              <a:t>new </a:t>
+            </a:r>
+            <a:r>
+              <a:rPr lang="en-US" sz="1600" b="0" i="0" u="none" strike="noStrike" baseline="0" dirty="0">
+                <a:solidFill>
+                  <a:srgbClr val="671466"/>
+                </a:solidFill>
+              </a:rPr>
+              <a:t>Intent</a:t>
+            </a:r>
+            <a:r>
+              <a:rPr lang="en-US" sz="1600" b="0" i="0" u="none" strike="noStrike" baseline="0" dirty="0">
+                <a:solidFill>
+                  <a:srgbClr val="666700"/>
+                </a:solidFill>
+              </a:rPr>
+              <a:t>();</a:t>
+            </a:r>
+          </a:p>
+          <a:p>
+            <a:pPr marL="914400" lvl="2" indent="0">
+              <a:spcBef>
+                <a:spcPts val="0"/>
+              </a:spcBef>
+              <a:spcAft>
+                <a:spcPts val="0"/>
+              </a:spcAft>
+              <a:buNone/>
+            </a:pPr>
+            <a:r>
+              <a:rPr lang="fr-FR" sz="1600" b="0" i="0" u="none" strike="noStrike" baseline="0" dirty="0">
+                <a:solidFill>
+                  <a:srgbClr val="000000"/>
+                </a:solidFill>
+              </a:rPr>
+              <a:t>sendIntent</a:t>
+            </a:r>
+            <a:r>
+              <a:rPr lang="fr-FR" sz="1600" b="0" i="0" u="none" strike="noStrike" baseline="0" dirty="0">
+                <a:solidFill>
+                  <a:srgbClr val="666700"/>
+                </a:solidFill>
+              </a:rPr>
+              <a:t>.</a:t>
+            </a:r>
+            <a:r>
+              <a:rPr lang="fr-FR" sz="1600" b="0" i="0" u="none" strike="noStrike" baseline="0" dirty="0">
+                <a:solidFill>
+                  <a:srgbClr val="000000"/>
+                </a:solidFill>
+              </a:rPr>
+              <a:t>setAction</a:t>
+            </a:r>
+            <a:r>
+              <a:rPr lang="fr-FR" sz="1600" b="0" i="0" u="none" strike="noStrike" baseline="0" dirty="0">
+                <a:solidFill>
+                  <a:srgbClr val="666700"/>
+                </a:solidFill>
+              </a:rPr>
+              <a:t>(</a:t>
+            </a:r>
+            <a:r>
+              <a:rPr lang="fr-FR" sz="1600" b="0" i="0" u="none" strike="noStrike" baseline="0" dirty="0">
+                <a:solidFill>
+                  <a:srgbClr val="671466"/>
+                </a:solidFill>
+              </a:rPr>
+              <a:t>Intent</a:t>
+            </a:r>
+            <a:r>
+              <a:rPr lang="fr-FR" sz="1600" b="0" i="0" u="none" strike="noStrike" baseline="0" dirty="0">
+                <a:solidFill>
+                  <a:srgbClr val="666700"/>
+                </a:solidFill>
+              </a:rPr>
+              <a:t>.</a:t>
+            </a:r>
+            <a:r>
+              <a:rPr lang="fr-FR" sz="1600" b="0" i="0" u="none" strike="noStrike" baseline="0" dirty="0">
+                <a:solidFill>
+                  <a:srgbClr val="000000"/>
+                </a:solidFill>
+              </a:rPr>
+              <a:t>ACTION_SEND</a:t>
+            </a:r>
+            <a:r>
+              <a:rPr lang="fr-FR" sz="1600" b="0" i="0" u="none" strike="noStrike" baseline="0" dirty="0">
+                <a:solidFill>
+                  <a:srgbClr val="666700"/>
+                </a:solidFill>
+              </a:rPr>
+              <a:t>);</a:t>
+            </a:r>
+          </a:p>
+          <a:p>
+            <a:pPr marL="914400" lvl="2" indent="0">
+              <a:spcBef>
+                <a:spcPts val="0"/>
+              </a:spcBef>
+              <a:spcAft>
+                <a:spcPts val="0"/>
+              </a:spcAft>
+              <a:buNone/>
+            </a:pPr>
+            <a:r>
+              <a:rPr lang="en-US" sz="1600" b="0" i="0" u="none" strike="noStrike" baseline="0" dirty="0">
+                <a:solidFill>
+                  <a:srgbClr val="000000"/>
+                </a:solidFill>
+              </a:rPr>
+              <a:t>sendIntent</a:t>
+            </a:r>
+            <a:r>
+              <a:rPr lang="en-US" sz="1600" b="0" i="0" u="none" strike="noStrike" baseline="0" dirty="0">
+                <a:solidFill>
+                  <a:srgbClr val="666700"/>
+                </a:solidFill>
+              </a:rPr>
+              <a:t>.</a:t>
+            </a:r>
+            <a:r>
+              <a:rPr lang="en-US" sz="1600" b="0" i="0" u="none" strike="noStrike" baseline="0" dirty="0">
+                <a:solidFill>
+                  <a:srgbClr val="000000"/>
+                </a:solidFill>
+              </a:rPr>
+              <a:t>putExtra</a:t>
+            </a:r>
+            <a:r>
+              <a:rPr lang="en-US" sz="1600" b="0" i="0" u="none" strike="noStrike" baseline="0" dirty="0">
+                <a:solidFill>
+                  <a:srgbClr val="666700"/>
+                </a:solidFill>
+              </a:rPr>
+              <a:t>(</a:t>
+            </a:r>
+            <a:r>
+              <a:rPr lang="en-US" sz="1600" b="0" i="0" u="none" strike="noStrike" baseline="0" dirty="0">
+                <a:solidFill>
+                  <a:srgbClr val="671466"/>
+                </a:solidFill>
+              </a:rPr>
+              <a:t>Intent</a:t>
+            </a:r>
+            <a:r>
+              <a:rPr lang="en-US" sz="1600" b="0" i="0" u="none" strike="noStrike" baseline="0" dirty="0">
+                <a:solidFill>
+                  <a:srgbClr val="666700"/>
+                </a:solidFill>
+              </a:rPr>
+              <a:t>.</a:t>
+            </a:r>
+            <a:r>
+              <a:rPr lang="en-US" sz="1600" b="0" i="0" u="none" strike="noStrike" baseline="0" dirty="0">
+                <a:solidFill>
+                  <a:srgbClr val="000000"/>
+                </a:solidFill>
+              </a:rPr>
+              <a:t>EXTRA_TEXT</a:t>
+            </a:r>
+            <a:r>
+              <a:rPr lang="en-US" sz="1600" b="0" i="0" u="none" strike="noStrike" baseline="0" dirty="0">
+                <a:solidFill>
+                  <a:srgbClr val="666700"/>
+                </a:solidFill>
+              </a:rPr>
+              <a:t>, </a:t>
+            </a:r>
+            <a:r>
+              <a:rPr lang="en-US" sz="1600" b="0" i="0" u="none" strike="noStrike" baseline="0" dirty="0">
+                <a:solidFill>
+                  <a:srgbClr val="000000"/>
+                </a:solidFill>
+              </a:rPr>
+              <a:t>textMessage</a:t>
+            </a:r>
+            <a:r>
+              <a:rPr lang="en-US" sz="1600" b="0" i="0" u="none" strike="noStrike" baseline="0" dirty="0">
+                <a:solidFill>
+                  <a:srgbClr val="666700"/>
+                </a:solidFill>
+              </a:rPr>
+              <a:t>);</a:t>
+            </a:r>
+          </a:p>
+          <a:p>
+            <a:pPr marL="914400" lvl="2" indent="0">
+              <a:spcBef>
+                <a:spcPts val="0"/>
+              </a:spcBef>
+              <a:spcAft>
+                <a:spcPts val="0"/>
+              </a:spcAft>
+              <a:buNone/>
+            </a:pPr>
+            <a:r>
+              <a:rPr lang="en-US" sz="1600" b="0" i="0" u="none" strike="noStrike" baseline="0" dirty="0">
+                <a:solidFill>
+                  <a:srgbClr val="000000"/>
+                </a:solidFill>
+              </a:rPr>
+              <a:t>sendIntent</a:t>
+            </a:r>
+            <a:r>
+              <a:rPr lang="en-US" sz="1600" b="0" i="0" u="none" strike="noStrike" baseline="0" dirty="0">
+                <a:solidFill>
+                  <a:srgbClr val="666700"/>
+                </a:solidFill>
+              </a:rPr>
+              <a:t>.</a:t>
+            </a:r>
+            <a:r>
+              <a:rPr lang="en-US" sz="1600" b="0" i="0" u="none" strike="noStrike" baseline="0" dirty="0">
+                <a:solidFill>
+                  <a:srgbClr val="000000"/>
+                </a:solidFill>
+              </a:rPr>
+              <a:t>setType</a:t>
+            </a:r>
+            <a:r>
+              <a:rPr lang="en-US" sz="1600" b="0" i="0" u="none" strike="noStrike" baseline="0" dirty="0">
+                <a:solidFill>
+                  <a:srgbClr val="666700"/>
+                </a:solidFill>
+              </a:rPr>
+              <a:t>(</a:t>
+            </a:r>
+            <a:r>
+              <a:rPr lang="en-US" sz="1600" b="0" i="0" u="none" strike="noStrike" baseline="0" dirty="0">
+                <a:solidFill>
+                  <a:srgbClr val="000000"/>
+                </a:solidFill>
+              </a:rPr>
+              <a:t>HTTP</a:t>
+            </a:r>
+            <a:r>
+              <a:rPr lang="en-US" sz="1600" b="0" i="0" u="none" strike="noStrike" baseline="0" dirty="0">
+                <a:solidFill>
+                  <a:srgbClr val="666700"/>
+                </a:solidFill>
+              </a:rPr>
+              <a:t>.</a:t>
+            </a:r>
+            <a:r>
+              <a:rPr lang="en-US" sz="1600" b="0" i="0" u="none" strike="noStrike" baseline="0" dirty="0">
+                <a:solidFill>
+                  <a:srgbClr val="000000"/>
+                </a:solidFill>
+              </a:rPr>
+              <a:t>PLAIN_TEXT_TYPE</a:t>
+            </a:r>
+            <a:r>
+              <a:rPr lang="en-US" sz="1600" b="0" i="0" u="none" strike="noStrike" baseline="0" dirty="0">
+                <a:solidFill>
+                  <a:srgbClr val="666700"/>
+                </a:solidFill>
+              </a:rPr>
+              <a:t>); </a:t>
+            </a:r>
+            <a:r>
+              <a:rPr lang="en-US" sz="1600" b="0" i="0" u="none" strike="noStrike" baseline="0" dirty="0">
+                <a:solidFill>
+                  <a:srgbClr val="006700"/>
+                </a:solidFill>
+              </a:rPr>
+              <a:t>// "text/plain" MIME type</a:t>
+            </a:r>
+            <a:endParaRPr lang="en-US" sz="1600" dirty="0"/>
+          </a:p>
+        </p:txBody>
+      </p:sp>
+      <p:sp>
+        <p:nvSpPr>
+          <p:cNvPr id="4" name="Footer Placeholder 3">
+            <a:extLst>
+              <a:ext uri="{FF2B5EF4-FFF2-40B4-BE49-F238E27FC236}">
+                <a16:creationId xmlns:a16="http://schemas.microsoft.com/office/drawing/2014/main" id="{D4B2DCD3-9110-2A83-D285-D85D4F25EDBA}"/>
+              </a:ext>
+            </a:extLst>
+          </p:cNvPr>
+          <p:cNvSpPr>
+            <a:spLocks noGrp="1"/>
+          </p:cNvSpPr>
+          <p:nvPr>
+            <p:ph type="ftr" sz="quarter" idx="11"/>
+          </p:nvPr>
+        </p:nvSpPr>
+        <p:spPr/>
+        <p:txBody>
+          <a:bodyPr/>
+          <a:lstStyle/>
+          <a:p>
+            <a:r>
+              <a:rPr lang="en-US" b="1" dirty="0"/>
+              <a:t>Presenter: Saibabu Devarapalli</a:t>
+            </a:r>
+            <a:endParaRPr lang="en-US" dirty="0"/>
+          </a:p>
+        </p:txBody>
+      </p:sp>
+      <p:sp>
+        <p:nvSpPr>
+          <p:cNvPr id="5" name="Slide Number Placeholder 4">
+            <a:extLst>
+              <a:ext uri="{FF2B5EF4-FFF2-40B4-BE49-F238E27FC236}">
+                <a16:creationId xmlns:a16="http://schemas.microsoft.com/office/drawing/2014/main" id="{298B1C64-001E-4313-DFA2-BAA5D2C0B844}"/>
+              </a:ext>
+            </a:extLst>
+          </p:cNvPr>
+          <p:cNvSpPr>
+            <a:spLocks noGrp="1"/>
+          </p:cNvSpPr>
+          <p:nvPr>
+            <p:ph type="sldNum" sz="quarter" idx="12"/>
+          </p:nvPr>
+        </p:nvSpPr>
+        <p:spPr/>
+        <p:txBody>
+          <a:bodyPr/>
+          <a:lstStyle/>
+          <a:p>
+            <a:fld id="{EE0D7808-EC4E-46D2-ABA0-EA3F9AF1A2E3}" type="slidenum">
+              <a:rPr lang="en-US" smtClean="0"/>
+              <a:t>13</a:t>
+            </a:fld>
+            <a:endParaRPr lang="en-US" dirty="0"/>
+          </a:p>
+        </p:txBody>
+      </p:sp>
+    </p:spTree>
+    <p:extLst>
+      <p:ext uri="{BB962C8B-B14F-4D97-AF65-F5344CB8AC3E}">
+        <p14:creationId xmlns:p14="http://schemas.microsoft.com/office/powerpoint/2010/main" val="2751967660"/>
+      </p:ext>
+    </p:extLst>
+  </p:cSld>
+  <p:clrMapOvr>
+    <a:masterClrMapping/>
+  </p:clrMapOvr>
+</p:sld>
+</file>
+
+<file path=ppt/slides/slide14.xml><?xml version="1.0" encoding="utf-8"?>
+<p:sld xmlns:a="http://schemas.openxmlformats.org/drawingml/2006/main" xmlns:r="http://schemas.openxmlformats.org/officeDocument/2006/relationships" xmlns:p="http://schemas.openxmlformats.org/presentationml/2006/main">
+  <p:cSld>
+    <p:spTree>
+      <p:nvGrpSpPr>
+        <p:cNvPr id="1" name=""/>
+        <p:cNvGrpSpPr/>
+        <p:nvPr/>
+      </p:nvGrpSpPr>
+      <p:grpSpPr>
+        <a:xfrm>
+          <a:off x="0" y="0"/>
+          <a:ext cx="0" cy="0"/>
+          <a:chOff x="0" y="0"/>
+          <a:chExt cx="0" cy="0"/>
+        </a:xfrm>
+      </p:grpSpPr>
+      <p:sp>
+        <p:nvSpPr>
+          <p:cNvPr id="2" name="Title 1">
+            <a:extLst>
+              <a:ext uri="{FF2B5EF4-FFF2-40B4-BE49-F238E27FC236}">
+                <a16:creationId xmlns:a16="http://schemas.microsoft.com/office/drawing/2014/main" id="{1F05E073-FB21-8AE5-9655-CB23B8C12FD0}"/>
+              </a:ext>
+            </a:extLst>
+          </p:cNvPr>
+          <p:cNvSpPr>
+            <a:spLocks noGrp="1"/>
+          </p:cNvSpPr>
+          <p:nvPr>
+            <p:ph type="title"/>
+          </p:nvPr>
+        </p:nvSpPr>
+        <p:spPr/>
+        <p:txBody>
+          <a:bodyPr/>
+          <a:lstStyle/>
+          <a:p>
+            <a:r>
+              <a:rPr lang="en-US" dirty="0"/>
+              <a:t>Intents: A Simple Illustration</a:t>
+            </a:r>
+          </a:p>
+        </p:txBody>
+      </p:sp>
+      <p:sp>
+        <p:nvSpPr>
+          <p:cNvPr id="4" name="Footer Placeholder 3">
+            <a:extLst>
+              <a:ext uri="{FF2B5EF4-FFF2-40B4-BE49-F238E27FC236}">
+                <a16:creationId xmlns:a16="http://schemas.microsoft.com/office/drawing/2014/main" id="{61118845-2FDC-D941-59FF-38F9B37EFF01}"/>
+              </a:ext>
+            </a:extLst>
+          </p:cNvPr>
+          <p:cNvSpPr>
+            <a:spLocks noGrp="1"/>
+          </p:cNvSpPr>
+          <p:nvPr>
+            <p:ph type="ftr" sz="quarter" idx="11"/>
+          </p:nvPr>
+        </p:nvSpPr>
+        <p:spPr/>
+        <p:txBody>
+          <a:bodyPr/>
+          <a:lstStyle/>
+          <a:p>
+            <a:r>
+              <a:rPr lang="en-US" b="1" dirty="0"/>
+              <a:t>Presenter: Saibabu Devarapalli</a:t>
+            </a:r>
+            <a:endParaRPr lang="en-US" dirty="0"/>
+          </a:p>
+        </p:txBody>
+      </p:sp>
+      <p:sp>
+        <p:nvSpPr>
+          <p:cNvPr id="5" name="Slide Number Placeholder 4">
+            <a:extLst>
+              <a:ext uri="{FF2B5EF4-FFF2-40B4-BE49-F238E27FC236}">
+                <a16:creationId xmlns:a16="http://schemas.microsoft.com/office/drawing/2014/main" id="{EF3A2BFE-C841-24FE-8ACB-DF60208B9915}"/>
+              </a:ext>
+            </a:extLst>
+          </p:cNvPr>
+          <p:cNvSpPr>
+            <a:spLocks noGrp="1"/>
+          </p:cNvSpPr>
+          <p:nvPr>
+            <p:ph type="sldNum" sz="quarter" idx="12"/>
+          </p:nvPr>
+        </p:nvSpPr>
+        <p:spPr/>
+        <p:txBody>
+          <a:bodyPr/>
+          <a:lstStyle/>
+          <a:p>
+            <a:fld id="{EE0D7808-EC4E-46D2-ABA0-EA3F9AF1A2E3}" type="slidenum">
+              <a:rPr lang="en-US" smtClean="0"/>
+              <a:t>14</a:t>
+            </a:fld>
+            <a:endParaRPr lang="en-US" dirty="0"/>
+          </a:p>
+        </p:txBody>
+      </p:sp>
+      <p:pic>
+        <p:nvPicPr>
+          <p:cNvPr id="23" name="Picture 22">
+            <a:extLst>
+              <a:ext uri="{FF2B5EF4-FFF2-40B4-BE49-F238E27FC236}">
+                <a16:creationId xmlns:a16="http://schemas.microsoft.com/office/drawing/2014/main" id="{03D0E7CB-A8DD-285A-A7F9-A42C7D67749B}"/>
+              </a:ext>
+            </a:extLst>
+          </p:cNvPr>
+          <p:cNvPicPr>
+            <a:picLocks noChangeAspect="1"/>
+          </p:cNvPicPr>
+          <p:nvPr/>
+        </p:nvPicPr>
+        <p:blipFill rotWithShape="1">
+          <a:blip r:embed="rId2"/>
+          <a:srcRect l="18529" t="36444" r="24083" b="5630"/>
+          <a:stretch/>
+        </p:blipFill>
+        <p:spPr>
+          <a:xfrm>
+            <a:off x="2255805" y="1506125"/>
+            <a:ext cx="7680390" cy="4044044"/>
+          </a:xfrm>
+          <a:prstGeom prst="rect">
+            <a:avLst/>
+          </a:prstGeom>
+        </p:spPr>
+      </p:pic>
+      <p:sp>
+        <p:nvSpPr>
+          <p:cNvPr id="3" name="TextBox 2">
+            <a:extLst>
+              <a:ext uri="{FF2B5EF4-FFF2-40B4-BE49-F238E27FC236}">
+                <a16:creationId xmlns:a16="http://schemas.microsoft.com/office/drawing/2014/main" id="{B9BE5143-A196-D59E-415C-D46B209EACEB}"/>
+              </a:ext>
+            </a:extLst>
+          </p:cNvPr>
+          <p:cNvSpPr txBox="1"/>
+          <p:nvPr/>
+        </p:nvSpPr>
+        <p:spPr>
+          <a:xfrm>
+            <a:off x="3761483" y="5576990"/>
+            <a:ext cx="4556055" cy="369332"/>
+          </a:xfrm>
+          <a:prstGeom prst="rect">
+            <a:avLst/>
+          </a:prstGeom>
+          <a:noFill/>
+        </p:spPr>
+        <p:txBody>
+          <a:bodyPr wrap="none" rtlCol="0">
+            <a:spAutoFit/>
+          </a:bodyPr>
+          <a:lstStyle/>
+          <a:p>
+            <a:r>
+              <a:rPr lang="en-US" b="1" dirty="0"/>
+              <a:t>Fig 7: </a:t>
+            </a:r>
+            <a:r>
+              <a:rPr lang="en-US" dirty="0"/>
+              <a:t>Simple example of how Intents are used</a:t>
+            </a:r>
+          </a:p>
+        </p:txBody>
+      </p:sp>
+    </p:spTree>
+    <p:extLst>
+      <p:ext uri="{BB962C8B-B14F-4D97-AF65-F5344CB8AC3E}">
+        <p14:creationId xmlns:p14="http://schemas.microsoft.com/office/powerpoint/2010/main" val="2899447535"/>
+      </p:ext>
+    </p:extLst>
+  </p:cSld>
+  <p:clrMapOvr>
+    <a:masterClrMapping/>
+  </p:clrMapOvr>
+</p:sld>
+</file>
+
 <file path=ppt/slides/slide2.xml><?xml version="1.0" encoding="utf-8"?>
 <p:sld xmlns:a="http://schemas.openxmlformats.org/drawingml/2006/main" xmlns:r="http://schemas.openxmlformats.org/officeDocument/2006/relationships" xmlns:p="http://schemas.openxmlformats.org/presentationml/2006/main">
   <p:cSld>

</xml_diff>